<commit_message>
working on best prac
</commit_message>
<xml_diff>
--- a/docs/img/graphics.pptx
+++ b/docs/img/graphics.pptx
@@ -7,6 +7,7 @@
   <p:sldIdLst>
     <p:sldId id="256" r:id="rId2"/>
     <p:sldId id="257" r:id="rId3"/>
+    <p:sldId id="258" r:id="rId4"/>
   </p:sldIdLst>
   <p:sldSz cx="12192000" cy="6858000"/>
   <p:notesSz cx="6858000" cy="9144000"/>
@@ -1522,7 +1523,7 @@
           <a:p>
             <a:fld id="{8CE7A9C6-D41E-4192-9A26-D27B921AC6F7}" type="datetimeFigureOut">
               <a:rPr lang="en-US" smtClean="0"/>
-              <a:t>3/12/2019</a:t>
+              <a:t>3/13/2019</a:t>
             </a:fld>
             <a:endParaRPr lang="en-US"/>
           </a:p>
@@ -2981,7 +2982,7 @@
           <a:p>
             <a:fld id="{8CE7A9C6-D41E-4192-9A26-D27B921AC6F7}" type="datetimeFigureOut">
               <a:rPr lang="en-US" smtClean="0"/>
-              <a:t>3/12/2019</a:t>
+              <a:t>3/13/2019</a:t>
             </a:fld>
             <a:endParaRPr lang="en-US"/>
           </a:p>
@@ -4434,7 +4435,7 @@
           <a:p>
             <a:fld id="{8CE7A9C6-D41E-4192-9A26-D27B921AC6F7}" type="datetimeFigureOut">
               <a:rPr lang="en-US" smtClean="0"/>
-              <a:t>3/12/2019</a:t>
+              <a:t>3/13/2019</a:t>
             </a:fld>
             <a:endParaRPr lang="en-US"/>
           </a:p>
@@ -5889,7 +5890,7 @@
           <a:p>
             <a:fld id="{8CE7A9C6-D41E-4192-9A26-D27B921AC6F7}" type="datetimeFigureOut">
               <a:rPr lang="en-US" smtClean="0"/>
-              <a:t>3/12/2019</a:t>
+              <a:t>3/13/2019</a:t>
             </a:fld>
             <a:endParaRPr lang="en-US"/>
           </a:p>
@@ -7397,7 +7398,7 @@
           <a:p>
             <a:fld id="{8CE7A9C6-D41E-4192-9A26-D27B921AC6F7}" type="datetimeFigureOut">
               <a:rPr lang="en-US" smtClean="0"/>
-              <a:t>3/12/2019</a:t>
+              <a:t>3/13/2019</a:t>
             </a:fld>
             <a:endParaRPr lang="en-US"/>
           </a:p>
@@ -8918,7 +8919,7 @@
           <a:p>
             <a:fld id="{8CE7A9C6-D41E-4192-9A26-D27B921AC6F7}" type="datetimeFigureOut">
               <a:rPr lang="en-US" smtClean="0"/>
-              <a:t>3/12/2019</a:t>
+              <a:t>3/13/2019</a:t>
             </a:fld>
             <a:endParaRPr lang="en-US"/>
           </a:p>
@@ -10583,7 +10584,7 @@
           <a:p>
             <a:fld id="{8CE7A9C6-D41E-4192-9A26-D27B921AC6F7}" type="datetimeFigureOut">
               <a:rPr lang="en-US" smtClean="0"/>
-              <a:t>3/12/2019</a:t>
+              <a:t>3/13/2019</a:t>
             </a:fld>
             <a:endParaRPr lang="en-US"/>
           </a:p>
@@ -11981,7 +11982,7 @@
           <a:p>
             <a:fld id="{8CE7A9C6-D41E-4192-9A26-D27B921AC6F7}" type="datetimeFigureOut">
               <a:rPr lang="en-US" smtClean="0"/>
-              <a:t>3/12/2019</a:t>
+              <a:t>3/13/2019</a:t>
             </a:fld>
             <a:endParaRPr lang="en-US"/>
           </a:p>
@@ -12081,7 +12082,7 @@
           <a:p>
             <a:fld id="{8CE7A9C6-D41E-4192-9A26-D27B921AC6F7}" type="datetimeFigureOut">
               <a:rPr lang="en-US" smtClean="0"/>
-              <a:t>3/12/2019</a:t>
+              <a:t>3/13/2019</a:t>
             </a:fld>
             <a:endParaRPr lang="en-US"/>
           </a:p>
@@ -13607,7 +13608,7 @@
           <a:p>
             <a:fld id="{8CE7A9C6-D41E-4192-9A26-D27B921AC6F7}" type="datetimeFigureOut">
               <a:rPr lang="en-US" smtClean="0"/>
-              <a:t>3/12/2019</a:t>
+              <a:t>3/13/2019</a:t>
             </a:fld>
             <a:endParaRPr lang="en-US"/>
           </a:p>
@@ -15143,7 +15144,7 @@
           <a:p>
             <a:fld id="{8CE7A9C6-D41E-4192-9A26-D27B921AC6F7}" type="datetimeFigureOut">
               <a:rPr lang="en-US" smtClean="0"/>
-              <a:t>3/12/2019</a:t>
+              <a:t>3/13/2019</a:t>
             </a:fld>
             <a:endParaRPr lang="en-US"/>
           </a:p>
@@ -15366,7 +15367,7 @@
           <a:p>
             <a:fld id="{8CE7A9C6-D41E-4192-9A26-D27B921AC6F7}" type="datetimeFigureOut">
               <a:rPr lang="en-US" smtClean="0"/>
-              <a:t>3/12/2019</a:t>
+              <a:t>3/13/2019</a:t>
             </a:fld>
             <a:endParaRPr lang="en-US"/>
           </a:p>
@@ -18910,6 +18911,2671 @@
       </p:grpSpPr>
       <p:grpSp>
         <p:nvGrpSpPr>
+          <p:cNvPr id="93" name="Group 92">
+            <a:extLst>
+              <a:ext uri="{FF2B5EF4-FFF2-40B4-BE49-F238E27FC236}">
+                <a16:creationId xmlns:a16="http://schemas.microsoft.com/office/drawing/2014/main" id="{FCAE7010-EAC1-44F0-A177-62E53DE7305C}"/>
+              </a:ext>
+            </a:extLst>
+          </p:cNvPr>
+          <p:cNvGrpSpPr/>
+          <p:nvPr/>
+        </p:nvGrpSpPr>
+        <p:grpSpPr>
+          <a:xfrm>
+            <a:off x="1618939" y="755242"/>
+            <a:ext cx="9038454" cy="5216184"/>
+            <a:chOff x="1618939" y="755242"/>
+            <a:chExt cx="9038454" cy="5216184"/>
+          </a:xfrm>
+        </p:grpSpPr>
+        <p:sp>
+          <p:nvSpPr>
+            <p:cNvPr id="43" name="Arc 42">
+              <a:extLst>
+                <a:ext uri="{FF2B5EF4-FFF2-40B4-BE49-F238E27FC236}">
+                  <a16:creationId xmlns:a16="http://schemas.microsoft.com/office/drawing/2014/main" id="{F35489C3-ED88-4C38-B943-79920926E2F3}"/>
+                </a:ext>
+              </a:extLst>
+            </p:cNvPr>
+            <p:cNvSpPr/>
+            <p:nvPr/>
+          </p:nvSpPr>
+          <p:spPr>
+            <a:xfrm rot="1975408">
+              <a:off x="9101562" y="3129625"/>
+              <a:ext cx="1038431" cy="1445412"/>
+            </a:xfrm>
+            <a:prstGeom prst="arc">
+              <a:avLst/>
+            </a:prstGeom>
+            <a:ln w="25400">
+              <a:solidFill>
+                <a:schemeClr val="accent2"/>
+              </a:solidFill>
+            </a:ln>
+          </p:spPr>
+          <p:style>
+            <a:lnRef idx="1">
+              <a:schemeClr val="accent1"/>
+            </a:lnRef>
+            <a:fillRef idx="0">
+              <a:schemeClr val="accent1"/>
+            </a:fillRef>
+            <a:effectRef idx="0">
+              <a:schemeClr val="accent1"/>
+            </a:effectRef>
+            <a:fontRef idx="minor">
+              <a:schemeClr val="tx1"/>
+            </a:fontRef>
+          </p:style>
+          <p:txBody>
+            <a:bodyPr rtlCol="0" anchor="ctr"/>
+            <a:lstStyle/>
+            <a:p>
+              <a:pPr algn="ctr"/>
+              <a:endParaRPr lang="en-US"/>
+            </a:p>
+          </p:txBody>
+        </p:sp>
+        <p:sp>
+          <p:nvSpPr>
+            <p:cNvPr id="13" name="Arc 12">
+              <a:extLst>
+                <a:ext uri="{FF2B5EF4-FFF2-40B4-BE49-F238E27FC236}">
+                  <a16:creationId xmlns:a16="http://schemas.microsoft.com/office/drawing/2014/main" id="{8EB8D554-6D03-4051-9E4E-6B32EFBE5F9A}"/>
+                </a:ext>
+              </a:extLst>
+            </p:cNvPr>
+            <p:cNvSpPr/>
+            <p:nvPr/>
+          </p:nvSpPr>
+          <p:spPr>
+            <a:xfrm>
+              <a:off x="7751404" y="1367082"/>
+              <a:ext cx="1645920" cy="1435864"/>
+            </a:xfrm>
+            <a:prstGeom prst="arc">
+              <a:avLst>
+                <a:gd name="adj1" fmla="val 16200000"/>
+                <a:gd name="adj2" fmla="val 21558206"/>
+              </a:avLst>
+            </a:prstGeom>
+            <a:ln w="25400">
+              <a:solidFill>
+                <a:schemeClr val="accent2"/>
+              </a:solidFill>
+              <a:tailEnd type="triangle"/>
+            </a:ln>
+          </p:spPr>
+          <p:style>
+            <a:lnRef idx="1">
+              <a:schemeClr val="accent1"/>
+            </a:lnRef>
+            <a:fillRef idx="0">
+              <a:schemeClr val="accent1"/>
+            </a:fillRef>
+            <a:effectRef idx="0">
+              <a:schemeClr val="accent1"/>
+            </a:effectRef>
+            <a:fontRef idx="minor">
+              <a:schemeClr val="tx1"/>
+            </a:fontRef>
+          </p:style>
+          <p:txBody>
+            <a:bodyPr rtlCol="0" anchor="ctr"/>
+            <a:lstStyle/>
+            <a:p>
+              <a:pPr algn="ctr"/>
+              <a:endParaRPr lang="en-US"/>
+            </a:p>
+          </p:txBody>
+        </p:sp>
+        <p:sp>
+          <p:nvSpPr>
+            <p:cNvPr id="20" name="Arc 19">
+              <a:extLst>
+                <a:ext uri="{FF2B5EF4-FFF2-40B4-BE49-F238E27FC236}">
+                  <a16:creationId xmlns:a16="http://schemas.microsoft.com/office/drawing/2014/main" id="{6EB50D86-6746-46E5-A7E9-C974B7A6D670}"/>
+                </a:ext>
+              </a:extLst>
+            </p:cNvPr>
+            <p:cNvSpPr/>
+            <p:nvPr/>
+          </p:nvSpPr>
+          <p:spPr>
+            <a:xfrm rot="1975408">
+              <a:off x="8804026" y="2813646"/>
+              <a:ext cx="1307416" cy="2086081"/>
+            </a:xfrm>
+            <a:prstGeom prst="arc">
+              <a:avLst/>
+            </a:prstGeom>
+            <a:ln w="25400">
+              <a:solidFill>
+                <a:schemeClr val="accent2"/>
+              </a:solidFill>
+            </a:ln>
+          </p:spPr>
+          <p:style>
+            <a:lnRef idx="1">
+              <a:schemeClr val="accent1"/>
+            </a:lnRef>
+            <a:fillRef idx="0">
+              <a:schemeClr val="accent1"/>
+            </a:fillRef>
+            <a:effectRef idx="0">
+              <a:schemeClr val="accent1"/>
+            </a:effectRef>
+            <a:fontRef idx="minor">
+              <a:schemeClr val="tx1"/>
+            </a:fontRef>
+          </p:style>
+          <p:txBody>
+            <a:bodyPr rtlCol="0" anchor="ctr"/>
+            <a:lstStyle/>
+            <a:p>
+              <a:pPr algn="ctr"/>
+              <a:endParaRPr lang="en-US"/>
+            </a:p>
+          </p:txBody>
+        </p:sp>
+        <p:sp>
+          <p:nvSpPr>
+            <p:cNvPr id="4" name="Rectangle 3">
+              <a:extLst>
+                <a:ext uri="{FF2B5EF4-FFF2-40B4-BE49-F238E27FC236}">
+                  <a16:creationId xmlns:a16="http://schemas.microsoft.com/office/drawing/2014/main" id="{26732FEE-0F22-4E5B-BD0B-B906151ACEE5}"/>
+                </a:ext>
+              </a:extLst>
+            </p:cNvPr>
+            <p:cNvSpPr/>
+            <p:nvPr/>
+          </p:nvSpPr>
+          <p:spPr>
+            <a:xfrm>
+              <a:off x="5321276" y="886573"/>
+              <a:ext cx="1995578" cy="1371600"/>
+            </a:xfrm>
+            <a:prstGeom prst="rect">
+              <a:avLst/>
+            </a:prstGeom>
+            <a:solidFill>
+              <a:schemeClr val="bg1">
+                <a:lumMod val="95000"/>
+              </a:schemeClr>
+            </a:solidFill>
+            <a:ln w="25400">
+              <a:solidFill>
+                <a:schemeClr val="accent6">
+                  <a:lumMod val="75000"/>
+                </a:schemeClr>
+              </a:solidFill>
+              <a:headEnd type="none" w="med" len="med"/>
+              <a:tailEnd type="none" w="med" len="med"/>
+            </a:ln>
+          </p:spPr>
+          <p:style>
+            <a:lnRef idx="2">
+              <a:schemeClr val="dk1"/>
+            </a:lnRef>
+            <a:fillRef idx="1">
+              <a:schemeClr val="lt1"/>
+            </a:fillRef>
+            <a:effectRef idx="0">
+              <a:schemeClr val="dk1"/>
+            </a:effectRef>
+            <a:fontRef idx="minor">
+              <a:schemeClr val="dk1"/>
+            </a:fontRef>
+          </p:style>
+          <p:txBody>
+            <a:bodyPr rtlCol="0" anchor="t" anchorCtr="0"/>
+            <a:lstStyle/>
+            <a:p>
+              <a:pPr algn="ctr"/>
+              <a:r>
+                <a:rPr lang="en-US" dirty="0">
+                  <a:latin typeface="Arial" panose="020B0604020202020204" pitchFamily="34" charset="0"/>
+                  <a:cs typeface="Arial" panose="020B0604020202020204" pitchFamily="34" charset="0"/>
+                </a:rPr>
+                <a:t>SecureObject0</a:t>
+              </a:r>
+            </a:p>
+          </p:txBody>
+        </p:sp>
+        <p:sp>
+          <p:nvSpPr>
+            <p:cNvPr id="5" name="Rectangle 4">
+              <a:extLst>
+                <a:ext uri="{FF2B5EF4-FFF2-40B4-BE49-F238E27FC236}">
+                  <a16:creationId xmlns:a16="http://schemas.microsoft.com/office/drawing/2014/main" id="{CD901EA8-EFFE-460A-B89E-2FCCC47E9B23}"/>
+                </a:ext>
+              </a:extLst>
+            </p:cNvPr>
+            <p:cNvSpPr/>
+            <p:nvPr/>
+          </p:nvSpPr>
+          <p:spPr>
+            <a:xfrm>
+              <a:off x="6707252" y="2493063"/>
+              <a:ext cx="1995578" cy="1371600"/>
+            </a:xfrm>
+            <a:prstGeom prst="rect">
+              <a:avLst/>
+            </a:prstGeom>
+            <a:solidFill>
+              <a:schemeClr val="bg1">
+                <a:lumMod val="95000"/>
+              </a:schemeClr>
+            </a:solidFill>
+            <a:ln w="25400">
+              <a:solidFill>
+                <a:schemeClr val="accent6">
+                  <a:lumMod val="75000"/>
+                </a:schemeClr>
+              </a:solidFill>
+              <a:headEnd type="none" w="med" len="med"/>
+              <a:tailEnd type="none" w="med" len="med"/>
+            </a:ln>
+          </p:spPr>
+          <p:style>
+            <a:lnRef idx="2">
+              <a:schemeClr val="dk1"/>
+            </a:lnRef>
+            <a:fillRef idx="1">
+              <a:schemeClr val="lt1"/>
+            </a:fillRef>
+            <a:effectRef idx="0">
+              <a:schemeClr val="dk1"/>
+            </a:effectRef>
+            <a:fontRef idx="minor">
+              <a:schemeClr val="dk1"/>
+            </a:fontRef>
+          </p:style>
+          <p:txBody>
+            <a:bodyPr rtlCol="0" anchor="t" anchorCtr="0"/>
+            <a:lstStyle/>
+            <a:p>
+              <a:pPr algn="ctr"/>
+              <a:r>
+                <a:rPr lang="en-US" dirty="0">
+                  <a:latin typeface="Arial" panose="020B0604020202020204" pitchFamily="34" charset="0"/>
+                  <a:cs typeface="Arial" panose="020B0604020202020204" pitchFamily="34" charset="0"/>
+                </a:rPr>
+                <a:t>SecureObject1</a:t>
+              </a:r>
+            </a:p>
+          </p:txBody>
+        </p:sp>
+        <p:sp>
+          <p:nvSpPr>
+            <p:cNvPr id="6" name="Rectangle 5">
+              <a:extLst>
+                <a:ext uri="{FF2B5EF4-FFF2-40B4-BE49-F238E27FC236}">
+                  <a16:creationId xmlns:a16="http://schemas.microsoft.com/office/drawing/2014/main" id="{400613CF-AF19-4455-B697-09831CD8CC5B}"/>
+                </a:ext>
+              </a:extLst>
+            </p:cNvPr>
+            <p:cNvSpPr/>
+            <p:nvPr/>
+          </p:nvSpPr>
+          <p:spPr>
+            <a:xfrm>
+              <a:off x="8090058" y="4097988"/>
+              <a:ext cx="1995578" cy="1371600"/>
+            </a:xfrm>
+            <a:prstGeom prst="rect">
+              <a:avLst/>
+            </a:prstGeom>
+            <a:solidFill>
+              <a:schemeClr val="bg1">
+                <a:lumMod val="95000"/>
+              </a:schemeClr>
+            </a:solidFill>
+            <a:ln w="25400">
+              <a:solidFill>
+                <a:schemeClr val="accent2"/>
+              </a:solidFill>
+              <a:headEnd type="none" w="med" len="med"/>
+              <a:tailEnd type="none" w="med" len="med"/>
+            </a:ln>
+          </p:spPr>
+          <p:style>
+            <a:lnRef idx="2">
+              <a:schemeClr val="dk1"/>
+            </a:lnRef>
+            <a:fillRef idx="1">
+              <a:schemeClr val="lt1"/>
+            </a:fillRef>
+            <a:effectRef idx="0">
+              <a:schemeClr val="dk1"/>
+            </a:effectRef>
+            <a:fontRef idx="minor">
+              <a:schemeClr val="dk1"/>
+            </a:fontRef>
+          </p:style>
+          <p:txBody>
+            <a:bodyPr rtlCol="0" anchor="t" anchorCtr="0"/>
+            <a:lstStyle/>
+            <a:p>
+              <a:pPr algn="ctr"/>
+              <a:r>
+                <a:rPr lang="en-US" dirty="0">
+                  <a:latin typeface="Arial" panose="020B0604020202020204" pitchFamily="34" charset="0"/>
+                  <a:cs typeface="Arial" panose="020B0604020202020204" pitchFamily="34" charset="0"/>
+                </a:rPr>
+                <a:t>SecureObject2</a:t>
+              </a:r>
+            </a:p>
+          </p:txBody>
+        </p:sp>
+        <p:cxnSp>
+          <p:nvCxnSpPr>
+            <p:cNvPr id="15" name="Straight Arrow Connector 14">
+              <a:extLst>
+                <a:ext uri="{FF2B5EF4-FFF2-40B4-BE49-F238E27FC236}">
+                  <a16:creationId xmlns:a16="http://schemas.microsoft.com/office/drawing/2014/main" id="{7867D89F-8F62-45E5-8EA6-8ABB6326F0BC}"/>
+                </a:ext>
+              </a:extLst>
+            </p:cNvPr>
+            <p:cNvCxnSpPr>
+              <a:cxnSpLocks/>
+              <a:stCxn id="4" idx="2"/>
+              <a:endCxn id="5" idx="1"/>
+            </p:cNvCxnSpPr>
+            <p:nvPr/>
+          </p:nvCxnSpPr>
+          <p:spPr>
+            <a:xfrm rot="16200000" flipH="1">
+              <a:off x="6052813" y="2524424"/>
+              <a:ext cx="920690" cy="388187"/>
+            </a:xfrm>
+            <a:prstGeom prst="bentConnector2">
+              <a:avLst/>
+            </a:prstGeom>
+            <a:ln w="25400">
+              <a:solidFill>
+                <a:schemeClr val="accent6">
+                  <a:lumMod val="75000"/>
+                </a:schemeClr>
+              </a:solidFill>
+              <a:tailEnd type="triangle"/>
+            </a:ln>
+          </p:spPr>
+          <p:style>
+            <a:lnRef idx="1">
+              <a:schemeClr val="accent1"/>
+            </a:lnRef>
+            <a:fillRef idx="0">
+              <a:schemeClr val="accent1"/>
+            </a:fillRef>
+            <a:effectRef idx="0">
+              <a:schemeClr val="accent1"/>
+            </a:effectRef>
+            <a:fontRef idx="minor">
+              <a:schemeClr val="tx1"/>
+            </a:fontRef>
+          </p:style>
+        </p:cxnSp>
+        <p:cxnSp>
+          <p:nvCxnSpPr>
+            <p:cNvPr id="19" name="Straight Arrow Connector 14">
+              <a:extLst>
+                <a:ext uri="{FF2B5EF4-FFF2-40B4-BE49-F238E27FC236}">
+                  <a16:creationId xmlns:a16="http://schemas.microsoft.com/office/drawing/2014/main" id="{7913D21B-E26B-4F99-B9B7-A443DC1C1591}"/>
+                </a:ext>
+              </a:extLst>
+            </p:cNvPr>
+            <p:cNvCxnSpPr>
+              <a:cxnSpLocks/>
+              <a:stCxn id="5" idx="2"/>
+              <a:endCxn id="6" idx="1"/>
+            </p:cNvCxnSpPr>
+            <p:nvPr/>
+          </p:nvCxnSpPr>
+          <p:spPr>
+            <a:xfrm rot="16200000" flipH="1">
+              <a:off x="7437987" y="4131716"/>
+              <a:ext cx="919125" cy="385017"/>
+            </a:xfrm>
+            <a:prstGeom prst="bentConnector2">
+              <a:avLst/>
+            </a:prstGeom>
+            <a:ln w="25400">
+              <a:solidFill>
+                <a:schemeClr val="accent2"/>
+              </a:solidFill>
+              <a:tailEnd type="triangle"/>
+            </a:ln>
+          </p:spPr>
+          <p:style>
+            <a:lnRef idx="1">
+              <a:schemeClr val="accent1"/>
+            </a:lnRef>
+            <a:fillRef idx="0">
+              <a:schemeClr val="accent1"/>
+            </a:fillRef>
+            <a:effectRef idx="0">
+              <a:schemeClr val="accent1"/>
+            </a:effectRef>
+            <a:fontRef idx="minor">
+              <a:schemeClr val="tx1"/>
+            </a:fontRef>
+          </p:style>
+        </p:cxnSp>
+        <p:grpSp>
+          <p:nvGrpSpPr>
+            <p:cNvPr id="28" name="Group 27">
+              <a:extLst>
+                <a:ext uri="{FF2B5EF4-FFF2-40B4-BE49-F238E27FC236}">
+                  <a16:creationId xmlns:a16="http://schemas.microsoft.com/office/drawing/2014/main" id="{72D61BCF-2BBD-41FF-A995-2A96807721A8}"/>
+                </a:ext>
+              </a:extLst>
+            </p:cNvPr>
+            <p:cNvGrpSpPr/>
+            <p:nvPr/>
+          </p:nvGrpSpPr>
+          <p:grpSpPr>
+            <a:xfrm>
+              <a:off x="7952900" y="4645063"/>
+              <a:ext cx="274320" cy="274320"/>
+              <a:chOff x="7913594" y="2117912"/>
+              <a:chExt cx="450476" cy="450476"/>
+            </a:xfrm>
+          </p:grpSpPr>
+          <p:sp>
+            <p:nvSpPr>
+              <p:cNvPr id="23" name="Oval 22">
+                <a:extLst>
+                  <a:ext uri="{FF2B5EF4-FFF2-40B4-BE49-F238E27FC236}">
+                    <a16:creationId xmlns:a16="http://schemas.microsoft.com/office/drawing/2014/main" id="{202865F3-961D-42A1-85F7-B103DC665B00}"/>
+                  </a:ext>
+                </a:extLst>
+              </p:cNvPr>
+              <p:cNvSpPr/>
+              <p:nvPr/>
+            </p:nvSpPr>
+            <p:spPr>
+              <a:xfrm>
+                <a:off x="7913594" y="2117912"/>
+                <a:ext cx="450476" cy="450476"/>
+              </a:xfrm>
+              <a:prstGeom prst="ellipse">
+                <a:avLst/>
+              </a:prstGeom>
+              <a:solidFill>
+                <a:schemeClr val="bg1">
+                  <a:lumMod val="95000"/>
+                </a:schemeClr>
+              </a:solidFill>
+              <a:ln w="25400">
+                <a:solidFill>
+                  <a:schemeClr val="accent2"/>
+                </a:solidFill>
+              </a:ln>
+            </p:spPr>
+            <p:style>
+              <a:lnRef idx="2">
+                <a:schemeClr val="accent1">
+                  <a:shade val="50000"/>
+                </a:schemeClr>
+              </a:lnRef>
+              <a:fillRef idx="1">
+                <a:schemeClr val="accent1"/>
+              </a:fillRef>
+              <a:effectRef idx="0">
+                <a:schemeClr val="accent1"/>
+              </a:effectRef>
+              <a:fontRef idx="minor">
+                <a:schemeClr val="lt1"/>
+              </a:fontRef>
+            </p:style>
+            <p:txBody>
+              <a:bodyPr rtlCol="0" anchor="ctr"/>
+              <a:lstStyle/>
+              <a:p>
+                <a:pPr algn="ctr"/>
+                <a:endParaRPr lang="en-US"/>
+              </a:p>
+            </p:txBody>
+          </p:sp>
+          <p:cxnSp>
+            <p:nvCxnSpPr>
+              <p:cNvPr id="25" name="Straight Connector 24">
+                <a:extLst>
+                  <a:ext uri="{FF2B5EF4-FFF2-40B4-BE49-F238E27FC236}">
+                    <a16:creationId xmlns:a16="http://schemas.microsoft.com/office/drawing/2014/main" id="{44B7F46B-2F78-47D8-B602-D854C866BA9B}"/>
+                  </a:ext>
+                </a:extLst>
+              </p:cNvPr>
+              <p:cNvCxnSpPr>
+                <a:cxnSpLocks/>
+                <a:stCxn id="23" idx="7"/>
+                <a:endCxn id="23" idx="3"/>
+              </p:cNvCxnSpPr>
+              <p:nvPr/>
+            </p:nvCxnSpPr>
+            <p:spPr>
+              <a:xfrm flipH="1">
+                <a:off x="7979565" y="2183883"/>
+                <a:ext cx="318534" cy="318534"/>
+              </a:xfrm>
+              <a:prstGeom prst="line">
+                <a:avLst/>
+              </a:prstGeom>
+              <a:ln w="25400">
+                <a:solidFill>
+                  <a:schemeClr val="accent2"/>
+                </a:solidFill>
+              </a:ln>
+            </p:spPr>
+            <p:style>
+              <a:lnRef idx="1">
+                <a:schemeClr val="accent1"/>
+              </a:lnRef>
+              <a:fillRef idx="0">
+                <a:schemeClr val="accent1"/>
+              </a:fillRef>
+              <a:effectRef idx="0">
+                <a:schemeClr val="accent1"/>
+              </a:effectRef>
+              <a:fontRef idx="minor">
+                <a:schemeClr val="tx1"/>
+              </a:fontRef>
+            </p:style>
+          </p:cxnSp>
+        </p:grpSp>
+        <p:sp>
+          <p:nvSpPr>
+            <p:cNvPr id="30" name="Rectangle 29">
+              <a:extLst>
+                <a:ext uri="{FF2B5EF4-FFF2-40B4-BE49-F238E27FC236}">
+                  <a16:creationId xmlns:a16="http://schemas.microsoft.com/office/drawing/2014/main" id="{6A249432-0671-4CEF-B4B6-4C059FA61F14}"/>
+                </a:ext>
+              </a:extLst>
+            </p:cNvPr>
+            <p:cNvSpPr/>
+            <p:nvPr/>
+          </p:nvSpPr>
+          <p:spPr>
+            <a:xfrm>
+              <a:off x="5495620" y="1235347"/>
+              <a:ext cx="3108960" cy="258680"/>
+            </a:xfrm>
+            <a:prstGeom prst="rect">
+              <a:avLst/>
+            </a:prstGeom>
+            <a:solidFill>
+              <a:schemeClr val="accent4">
+                <a:lumMod val="20000"/>
+                <a:lumOff val="80000"/>
+              </a:schemeClr>
+            </a:solidFill>
+            <a:ln w="25400">
+              <a:solidFill>
+                <a:schemeClr val="accent2"/>
+              </a:solidFill>
+            </a:ln>
+          </p:spPr>
+          <p:style>
+            <a:lnRef idx="2">
+              <a:schemeClr val="accent1">
+                <a:shade val="50000"/>
+              </a:schemeClr>
+            </a:lnRef>
+            <a:fillRef idx="1">
+              <a:schemeClr val="accent1"/>
+            </a:fillRef>
+            <a:effectRef idx="0">
+              <a:schemeClr val="accent1"/>
+            </a:effectRef>
+            <a:fontRef idx="minor">
+              <a:schemeClr val="lt1"/>
+            </a:fontRef>
+          </p:style>
+          <p:txBody>
+            <a:bodyPr rtlCol="0" anchor="ctr"/>
+            <a:lstStyle/>
+            <a:p>
+              <a:r>
+                <a:rPr lang="en-US" sz="1400" dirty="0">
+                  <a:solidFill>
+                    <a:schemeClr val="tx1"/>
+                  </a:solidFill>
+                  <a:latin typeface="Arial" panose="020B0604020202020204" pitchFamily="34" charset="0"/>
+                  <a:cs typeface="Arial" panose="020B0604020202020204" pitchFamily="34" charset="0"/>
+                </a:rPr>
+                <a:t>Role1 – </a:t>
+              </a:r>
+              <a:r>
+                <a:rPr lang="en-US" sz="1400" dirty="0" err="1">
+                  <a:solidFill>
+                    <a:schemeClr val="tx1"/>
+                  </a:solidFill>
+                  <a:latin typeface="Arial" panose="020B0604020202020204" pitchFamily="34" charset="0"/>
+                  <a:cs typeface="Arial" panose="020B0604020202020204" pitchFamily="34" charset="0"/>
+                </a:rPr>
+                <a:t>RecordRight.FullControl</a:t>
+              </a:r>
+              <a:endParaRPr lang="en-US" sz="1400" dirty="0">
+                <a:solidFill>
+                  <a:schemeClr val="tx1"/>
+                </a:solidFill>
+                <a:latin typeface="Arial" panose="020B0604020202020204" pitchFamily="34" charset="0"/>
+                <a:cs typeface="Arial" panose="020B0604020202020204" pitchFamily="34" charset="0"/>
+              </a:endParaRPr>
+            </a:p>
+          </p:txBody>
+        </p:sp>
+        <p:sp>
+          <p:nvSpPr>
+            <p:cNvPr id="31" name="Rectangle 30">
+              <a:extLst>
+                <a:ext uri="{FF2B5EF4-FFF2-40B4-BE49-F238E27FC236}">
+                  <a16:creationId xmlns:a16="http://schemas.microsoft.com/office/drawing/2014/main" id="{FF01DA99-4E2B-4AA9-8F71-CC4E11C98E6C}"/>
+                </a:ext>
+              </a:extLst>
+            </p:cNvPr>
+            <p:cNvSpPr/>
+            <p:nvPr/>
+          </p:nvSpPr>
+          <p:spPr>
+            <a:xfrm>
+              <a:off x="5321275" y="2044231"/>
+              <a:ext cx="1645920" cy="213942"/>
+            </a:xfrm>
+            <a:prstGeom prst="rect">
+              <a:avLst/>
+            </a:prstGeom>
+            <a:solidFill>
+              <a:schemeClr val="accent6">
+                <a:lumMod val="75000"/>
+              </a:schemeClr>
+            </a:solidFill>
+            <a:ln>
+              <a:solidFill>
+                <a:schemeClr val="accent6">
+                  <a:lumMod val="75000"/>
+                </a:schemeClr>
+              </a:solidFill>
+            </a:ln>
+          </p:spPr>
+          <p:style>
+            <a:lnRef idx="2">
+              <a:schemeClr val="accent1">
+                <a:shade val="50000"/>
+              </a:schemeClr>
+            </a:lnRef>
+            <a:fillRef idx="1">
+              <a:schemeClr val="accent1"/>
+            </a:fillRef>
+            <a:effectRef idx="0">
+              <a:schemeClr val="accent1"/>
+            </a:effectRef>
+            <a:fontRef idx="minor">
+              <a:schemeClr val="lt1"/>
+            </a:fontRef>
+          </p:style>
+          <p:txBody>
+            <a:bodyPr rtlCol="0" anchor="ctr"/>
+            <a:lstStyle/>
+            <a:p>
+              <a:pPr algn="ctr"/>
+              <a:r>
+                <a:rPr lang="en-US" sz="1400" dirty="0">
+                  <a:latin typeface="Arial" panose="020B0604020202020204" pitchFamily="34" charset="0"/>
+                  <a:cs typeface="Arial" panose="020B0604020202020204" pitchFamily="34" charset="0"/>
+                </a:rPr>
+                <a:t>Allow Inheritance</a:t>
+              </a:r>
+            </a:p>
+          </p:txBody>
+        </p:sp>
+        <p:sp>
+          <p:nvSpPr>
+            <p:cNvPr id="32" name="Rectangle 31">
+              <a:extLst>
+                <a:ext uri="{FF2B5EF4-FFF2-40B4-BE49-F238E27FC236}">
+                  <a16:creationId xmlns:a16="http://schemas.microsoft.com/office/drawing/2014/main" id="{FD3B2029-E28A-44C4-90B2-C28675F34AE3}"/>
+                </a:ext>
+              </a:extLst>
+            </p:cNvPr>
+            <p:cNvSpPr/>
+            <p:nvPr/>
+          </p:nvSpPr>
+          <p:spPr>
+            <a:xfrm>
+              <a:off x="6707251" y="3650721"/>
+              <a:ext cx="1645920" cy="213942"/>
+            </a:xfrm>
+            <a:prstGeom prst="rect">
+              <a:avLst/>
+            </a:prstGeom>
+            <a:solidFill>
+              <a:schemeClr val="accent6">
+                <a:lumMod val="75000"/>
+              </a:schemeClr>
+            </a:solidFill>
+            <a:ln>
+              <a:solidFill>
+                <a:schemeClr val="accent6">
+                  <a:lumMod val="75000"/>
+                </a:schemeClr>
+              </a:solidFill>
+            </a:ln>
+          </p:spPr>
+          <p:style>
+            <a:lnRef idx="2">
+              <a:schemeClr val="accent1">
+                <a:shade val="50000"/>
+              </a:schemeClr>
+            </a:lnRef>
+            <a:fillRef idx="1">
+              <a:schemeClr val="accent1"/>
+            </a:fillRef>
+            <a:effectRef idx="0">
+              <a:schemeClr val="accent1"/>
+            </a:effectRef>
+            <a:fontRef idx="minor">
+              <a:schemeClr val="lt1"/>
+            </a:fontRef>
+          </p:style>
+          <p:txBody>
+            <a:bodyPr rtlCol="0" anchor="ctr"/>
+            <a:lstStyle/>
+            <a:p>
+              <a:pPr algn="ctr"/>
+              <a:r>
+                <a:rPr lang="en-US" sz="1400" dirty="0">
+                  <a:latin typeface="Arial" panose="020B0604020202020204" pitchFamily="34" charset="0"/>
+                  <a:cs typeface="Arial" panose="020B0604020202020204" pitchFamily="34" charset="0"/>
+                </a:rPr>
+                <a:t>Allow Inheritance</a:t>
+              </a:r>
+            </a:p>
+          </p:txBody>
+        </p:sp>
+        <p:sp>
+          <p:nvSpPr>
+            <p:cNvPr id="33" name="Rectangle 32">
+              <a:extLst>
+                <a:ext uri="{FF2B5EF4-FFF2-40B4-BE49-F238E27FC236}">
+                  <a16:creationId xmlns:a16="http://schemas.microsoft.com/office/drawing/2014/main" id="{D34DC799-9D41-4095-A8B2-958B48D09691}"/>
+                </a:ext>
+              </a:extLst>
+            </p:cNvPr>
+            <p:cNvSpPr/>
+            <p:nvPr/>
+          </p:nvSpPr>
+          <p:spPr>
+            <a:xfrm>
+              <a:off x="8090057" y="5255646"/>
+              <a:ext cx="1645920" cy="213942"/>
+            </a:xfrm>
+            <a:prstGeom prst="rect">
+              <a:avLst/>
+            </a:prstGeom>
+            <a:solidFill>
+              <a:schemeClr val="accent2"/>
+            </a:solidFill>
+            <a:ln>
+              <a:solidFill>
+                <a:schemeClr val="accent2"/>
+              </a:solidFill>
+            </a:ln>
+          </p:spPr>
+          <p:style>
+            <a:lnRef idx="2">
+              <a:schemeClr val="accent1">
+                <a:shade val="50000"/>
+              </a:schemeClr>
+            </a:lnRef>
+            <a:fillRef idx="1">
+              <a:schemeClr val="accent1"/>
+            </a:fillRef>
+            <a:effectRef idx="0">
+              <a:schemeClr val="accent1"/>
+            </a:effectRef>
+            <a:fontRef idx="minor">
+              <a:schemeClr val="lt1"/>
+            </a:fontRef>
+          </p:style>
+          <p:txBody>
+            <a:bodyPr rtlCol="0" anchor="ctr"/>
+            <a:lstStyle/>
+            <a:p>
+              <a:pPr algn="ctr"/>
+              <a:r>
+                <a:rPr lang="en-US" sz="1400" dirty="0">
+                  <a:latin typeface="Arial" panose="020B0604020202020204" pitchFamily="34" charset="0"/>
+                  <a:cs typeface="Arial" panose="020B0604020202020204" pitchFamily="34" charset="0"/>
+                </a:rPr>
+                <a:t>Block Inheritance</a:t>
+              </a:r>
+            </a:p>
+          </p:txBody>
+        </p:sp>
+        <p:sp>
+          <p:nvSpPr>
+            <p:cNvPr id="34" name="Rectangle 33">
+              <a:extLst>
+                <a:ext uri="{FF2B5EF4-FFF2-40B4-BE49-F238E27FC236}">
+                  <a16:creationId xmlns:a16="http://schemas.microsoft.com/office/drawing/2014/main" id="{A37FDC9B-CC41-4187-8140-D834B2136022}"/>
+                </a:ext>
+              </a:extLst>
+            </p:cNvPr>
+            <p:cNvSpPr/>
+            <p:nvPr/>
+          </p:nvSpPr>
+          <p:spPr>
+            <a:xfrm>
+              <a:off x="6904889" y="2843120"/>
+              <a:ext cx="3108960" cy="256032"/>
+            </a:xfrm>
+            <a:prstGeom prst="rect">
+              <a:avLst/>
+            </a:prstGeom>
+            <a:solidFill>
+              <a:schemeClr val="accent4">
+                <a:lumMod val="20000"/>
+                <a:lumOff val="80000"/>
+              </a:schemeClr>
+            </a:solidFill>
+            <a:ln w="25400">
+              <a:solidFill>
+                <a:schemeClr val="accent6">
+                  <a:lumMod val="75000"/>
+                </a:schemeClr>
+              </a:solidFill>
+            </a:ln>
+          </p:spPr>
+          <p:style>
+            <a:lnRef idx="2">
+              <a:schemeClr val="accent1">
+                <a:shade val="50000"/>
+              </a:schemeClr>
+            </a:lnRef>
+            <a:fillRef idx="1">
+              <a:schemeClr val="accent1"/>
+            </a:fillRef>
+            <a:effectRef idx="0">
+              <a:schemeClr val="accent1"/>
+            </a:effectRef>
+            <a:fontRef idx="minor">
+              <a:schemeClr val="lt1"/>
+            </a:fontRef>
+          </p:style>
+          <p:txBody>
+            <a:bodyPr rtlCol="0" anchor="ctr"/>
+            <a:lstStyle/>
+            <a:p>
+              <a:r>
+                <a:rPr lang="en-US" sz="1400" dirty="0">
+                  <a:solidFill>
+                    <a:schemeClr val="tx1"/>
+                  </a:solidFill>
+                  <a:latin typeface="Arial" panose="020B0604020202020204" pitchFamily="34" charset="0"/>
+                  <a:cs typeface="Arial" panose="020B0604020202020204" pitchFamily="34" charset="0"/>
+                </a:rPr>
+                <a:t>Role2 – </a:t>
+              </a:r>
+              <a:r>
+                <a:rPr lang="en-US" sz="1400" dirty="0" err="1">
+                  <a:solidFill>
+                    <a:schemeClr val="tx1"/>
+                  </a:solidFill>
+                  <a:latin typeface="Arial" panose="020B0604020202020204" pitchFamily="34" charset="0"/>
+                  <a:cs typeface="Arial" panose="020B0604020202020204" pitchFamily="34" charset="0"/>
+                </a:rPr>
+                <a:t>RecordRight.Insert</a:t>
+              </a:r>
+              <a:r>
+                <a:rPr lang="en-US" sz="1400" dirty="0">
+                  <a:solidFill>
+                    <a:schemeClr val="tx1"/>
+                  </a:solidFill>
+                  <a:latin typeface="Arial" panose="020B0604020202020204" pitchFamily="34" charset="0"/>
+                  <a:cs typeface="Arial" panose="020B0604020202020204" pitchFamily="34" charset="0"/>
+                </a:rPr>
+                <a:t> | Update</a:t>
+              </a:r>
+            </a:p>
+          </p:txBody>
+        </p:sp>
+        <p:cxnSp>
+          <p:nvCxnSpPr>
+            <p:cNvPr id="39" name="Straight Arrow Connector 38">
+              <a:extLst>
+                <a:ext uri="{FF2B5EF4-FFF2-40B4-BE49-F238E27FC236}">
+                  <a16:creationId xmlns:a16="http://schemas.microsoft.com/office/drawing/2014/main" id="{7DC8D7AD-89E2-46D5-8EF3-C558B77E3E87}"/>
+                </a:ext>
+              </a:extLst>
+            </p:cNvPr>
+            <p:cNvCxnSpPr>
+              <a:cxnSpLocks/>
+              <a:stCxn id="26" idx="3"/>
+            </p:cNvCxnSpPr>
+            <p:nvPr/>
+          </p:nvCxnSpPr>
+          <p:spPr>
+            <a:xfrm>
+              <a:off x="8604580" y="1672549"/>
+              <a:ext cx="589751" cy="1170571"/>
+            </a:xfrm>
+            <a:prstGeom prst="curvedConnector2">
+              <a:avLst/>
+            </a:prstGeom>
+            <a:ln w="25400">
+              <a:solidFill>
+                <a:schemeClr val="accent6">
+                  <a:lumMod val="75000"/>
+                </a:schemeClr>
+              </a:solidFill>
+              <a:tailEnd type="triangle"/>
+            </a:ln>
+          </p:spPr>
+          <p:style>
+            <a:lnRef idx="1">
+              <a:schemeClr val="accent1"/>
+            </a:lnRef>
+            <a:fillRef idx="0">
+              <a:schemeClr val="accent1"/>
+            </a:fillRef>
+            <a:effectRef idx="0">
+              <a:schemeClr val="accent1"/>
+            </a:effectRef>
+            <a:fontRef idx="minor">
+              <a:schemeClr val="tx1"/>
+            </a:fontRef>
+          </p:style>
+        </p:cxnSp>
+        <p:grpSp>
+          <p:nvGrpSpPr>
+            <p:cNvPr id="45" name="Group 44">
+              <a:extLst>
+                <a:ext uri="{FF2B5EF4-FFF2-40B4-BE49-F238E27FC236}">
+                  <a16:creationId xmlns:a16="http://schemas.microsoft.com/office/drawing/2014/main" id="{F2B37A6A-3E5A-4A8D-9AEC-9B32B872A46E}"/>
+                </a:ext>
+              </a:extLst>
+            </p:cNvPr>
+            <p:cNvGrpSpPr/>
+            <p:nvPr/>
+          </p:nvGrpSpPr>
+          <p:grpSpPr>
+            <a:xfrm>
+              <a:off x="9960522" y="3960828"/>
+              <a:ext cx="274320" cy="274320"/>
+              <a:chOff x="7913594" y="2117912"/>
+              <a:chExt cx="450476" cy="450476"/>
+            </a:xfrm>
+          </p:grpSpPr>
+          <p:sp>
+            <p:nvSpPr>
+              <p:cNvPr id="46" name="Oval 45">
+                <a:extLst>
+                  <a:ext uri="{FF2B5EF4-FFF2-40B4-BE49-F238E27FC236}">
+                    <a16:creationId xmlns:a16="http://schemas.microsoft.com/office/drawing/2014/main" id="{DF4359BF-359E-4F29-B890-A98B05510170}"/>
+                  </a:ext>
+                </a:extLst>
+              </p:cNvPr>
+              <p:cNvSpPr/>
+              <p:nvPr/>
+            </p:nvSpPr>
+            <p:spPr>
+              <a:xfrm>
+                <a:off x="7913594" y="2117912"/>
+                <a:ext cx="450476" cy="450476"/>
+              </a:xfrm>
+              <a:prstGeom prst="ellipse">
+                <a:avLst/>
+              </a:prstGeom>
+              <a:solidFill>
+                <a:schemeClr val="bg1">
+                  <a:lumMod val="95000"/>
+                </a:schemeClr>
+              </a:solidFill>
+              <a:ln w="25400">
+                <a:solidFill>
+                  <a:schemeClr val="accent2"/>
+                </a:solidFill>
+              </a:ln>
+            </p:spPr>
+            <p:style>
+              <a:lnRef idx="2">
+                <a:schemeClr val="accent1">
+                  <a:shade val="50000"/>
+                </a:schemeClr>
+              </a:lnRef>
+              <a:fillRef idx="1">
+                <a:schemeClr val="accent1"/>
+              </a:fillRef>
+              <a:effectRef idx="0">
+                <a:schemeClr val="accent1"/>
+              </a:effectRef>
+              <a:fontRef idx="minor">
+                <a:schemeClr val="lt1"/>
+              </a:fontRef>
+            </p:style>
+            <p:txBody>
+              <a:bodyPr rtlCol="0" anchor="ctr"/>
+              <a:lstStyle/>
+              <a:p>
+                <a:pPr algn="ctr"/>
+                <a:endParaRPr lang="en-US"/>
+              </a:p>
+            </p:txBody>
+          </p:sp>
+          <p:cxnSp>
+            <p:nvCxnSpPr>
+              <p:cNvPr id="47" name="Straight Connector 46">
+                <a:extLst>
+                  <a:ext uri="{FF2B5EF4-FFF2-40B4-BE49-F238E27FC236}">
+                    <a16:creationId xmlns:a16="http://schemas.microsoft.com/office/drawing/2014/main" id="{6630CE86-ADFD-467E-8E9B-B5FA0D3934BF}"/>
+                  </a:ext>
+                </a:extLst>
+              </p:cNvPr>
+              <p:cNvCxnSpPr>
+                <a:cxnSpLocks/>
+                <a:stCxn id="46" idx="7"/>
+                <a:endCxn id="46" idx="3"/>
+              </p:cNvCxnSpPr>
+              <p:nvPr/>
+            </p:nvCxnSpPr>
+            <p:spPr>
+              <a:xfrm flipH="1">
+                <a:off x="7979565" y="2183883"/>
+                <a:ext cx="318534" cy="318534"/>
+              </a:xfrm>
+              <a:prstGeom prst="line">
+                <a:avLst/>
+              </a:prstGeom>
+              <a:ln w="25400">
+                <a:solidFill>
+                  <a:schemeClr val="accent2"/>
+                </a:solidFill>
+              </a:ln>
+            </p:spPr>
+            <p:style>
+              <a:lnRef idx="1">
+                <a:schemeClr val="accent1"/>
+              </a:lnRef>
+              <a:fillRef idx="0">
+                <a:schemeClr val="accent1"/>
+              </a:fillRef>
+              <a:effectRef idx="0">
+                <a:schemeClr val="accent1"/>
+              </a:effectRef>
+              <a:fontRef idx="minor">
+                <a:schemeClr val="tx1"/>
+              </a:fontRef>
+            </p:style>
+          </p:cxnSp>
+        </p:grpSp>
+        <p:sp>
+          <p:nvSpPr>
+            <p:cNvPr id="48" name="TextBox 47">
+              <a:extLst>
+                <a:ext uri="{FF2B5EF4-FFF2-40B4-BE49-F238E27FC236}">
+                  <a16:creationId xmlns:a16="http://schemas.microsoft.com/office/drawing/2014/main" id="{17767469-1EFE-438C-8B7D-9FC2BCA9D6DE}"/>
+                </a:ext>
+              </a:extLst>
+            </p:cNvPr>
+            <p:cNvSpPr txBox="1"/>
+            <p:nvPr/>
+          </p:nvSpPr>
+          <p:spPr>
+            <a:xfrm>
+              <a:off x="9161471" y="2234723"/>
+              <a:ext cx="1495922" cy="461665"/>
+            </a:xfrm>
+            <a:prstGeom prst="rect">
+              <a:avLst/>
+            </a:prstGeom>
+            <a:noFill/>
+          </p:spPr>
+          <p:txBody>
+            <a:bodyPr wrap="none" rtlCol="0">
+              <a:spAutoFit/>
+            </a:bodyPr>
+            <a:lstStyle/>
+            <a:p>
+              <a:r>
+                <a:rPr lang="en-US" sz="1200" dirty="0">
+                  <a:solidFill>
+                    <a:schemeClr val="accent6">
+                      <a:lumMod val="75000"/>
+                    </a:schemeClr>
+                  </a:solidFill>
+                  <a:latin typeface="Arial" panose="020B0604020202020204" pitchFamily="34" charset="0"/>
+                  <a:cs typeface="Arial" panose="020B0604020202020204" pitchFamily="34" charset="0"/>
+                </a:rPr>
+                <a:t>Ace propagates</a:t>
+              </a:r>
+            </a:p>
+            <a:p>
+              <a:r>
+                <a:rPr lang="en-US" sz="1200" dirty="0">
+                  <a:solidFill>
+                    <a:schemeClr val="accent6">
+                      <a:lumMod val="75000"/>
+                    </a:schemeClr>
+                  </a:solidFill>
+                  <a:latin typeface="Arial" panose="020B0604020202020204" pitchFamily="34" charset="0"/>
+                  <a:cs typeface="Arial" panose="020B0604020202020204" pitchFamily="34" charset="0"/>
+                </a:rPr>
+                <a:t>through inheritance</a:t>
+              </a:r>
+            </a:p>
+          </p:txBody>
+        </p:sp>
+        <p:sp>
+          <p:nvSpPr>
+            <p:cNvPr id="49" name="TextBox 48">
+              <a:extLst>
+                <a:ext uri="{FF2B5EF4-FFF2-40B4-BE49-F238E27FC236}">
+                  <a16:creationId xmlns:a16="http://schemas.microsoft.com/office/drawing/2014/main" id="{FF100D78-25EE-4FA3-8DC3-D777E2DCDB59}"/>
+                </a:ext>
+              </a:extLst>
+            </p:cNvPr>
+            <p:cNvSpPr txBox="1"/>
+            <p:nvPr/>
+          </p:nvSpPr>
+          <p:spPr>
+            <a:xfrm>
+              <a:off x="8088100" y="5509761"/>
+              <a:ext cx="2146742" cy="461665"/>
+            </a:xfrm>
+            <a:prstGeom prst="rect">
+              <a:avLst/>
+            </a:prstGeom>
+            <a:noFill/>
+          </p:spPr>
+          <p:txBody>
+            <a:bodyPr wrap="none" rtlCol="0">
+              <a:spAutoFit/>
+            </a:bodyPr>
+            <a:lstStyle/>
+            <a:p>
+              <a:r>
+                <a:rPr lang="en-US" sz="1200" dirty="0">
+                  <a:solidFill>
+                    <a:schemeClr val="accent2"/>
+                  </a:solidFill>
+                  <a:latin typeface="Arial" panose="020B0604020202020204" pitchFamily="34" charset="0"/>
+                  <a:cs typeface="Arial" panose="020B0604020202020204" pitchFamily="34" charset="0"/>
+                </a:rPr>
+                <a:t>No Aces as inheritance is</a:t>
+              </a:r>
+            </a:p>
+            <a:p>
+              <a:r>
+                <a:rPr lang="en-US" sz="1200" dirty="0">
+                  <a:solidFill>
+                    <a:schemeClr val="accent2"/>
+                  </a:solidFill>
+                  <a:latin typeface="Arial" panose="020B0604020202020204" pitchFamily="34" charset="0"/>
+                  <a:cs typeface="Arial" panose="020B0604020202020204" pitchFamily="34" charset="0"/>
+                </a:rPr>
+                <a:t>blocked by the SecureObject</a:t>
+              </a:r>
+            </a:p>
+          </p:txBody>
+        </p:sp>
+        <p:sp>
+          <p:nvSpPr>
+            <p:cNvPr id="26" name="Rectangle 25">
+              <a:extLst>
+                <a:ext uri="{FF2B5EF4-FFF2-40B4-BE49-F238E27FC236}">
+                  <a16:creationId xmlns:a16="http://schemas.microsoft.com/office/drawing/2014/main" id="{707C70A1-2DA6-42B8-98AB-C4B0D440C198}"/>
+                </a:ext>
+              </a:extLst>
+            </p:cNvPr>
+            <p:cNvSpPr/>
+            <p:nvPr/>
+          </p:nvSpPr>
+          <p:spPr>
+            <a:xfrm>
+              <a:off x="5495620" y="1543209"/>
+              <a:ext cx="3108960" cy="258680"/>
+            </a:xfrm>
+            <a:prstGeom prst="rect">
+              <a:avLst/>
+            </a:prstGeom>
+            <a:solidFill>
+              <a:schemeClr val="accent4">
+                <a:lumMod val="20000"/>
+                <a:lumOff val="80000"/>
+              </a:schemeClr>
+            </a:solidFill>
+            <a:ln w="25400">
+              <a:solidFill>
+                <a:schemeClr val="accent6">
+                  <a:lumMod val="75000"/>
+                </a:schemeClr>
+              </a:solidFill>
+            </a:ln>
+          </p:spPr>
+          <p:style>
+            <a:lnRef idx="2">
+              <a:schemeClr val="accent1">
+                <a:shade val="50000"/>
+              </a:schemeClr>
+            </a:lnRef>
+            <a:fillRef idx="1">
+              <a:schemeClr val="accent1"/>
+            </a:fillRef>
+            <a:effectRef idx="0">
+              <a:schemeClr val="accent1"/>
+            </a:effectRef>
+            <a:fontRef idx="minor">
+              <a:schemeClr val="lt1"/>
+            </a:fontRef>
+          </p:style>
+          <p:txBody>
+            <a:bodyPr rtlCol="0" anchor="ctr"/>
+            <a:lstStyle/>
+            <a:p>
+              <a:r>
+                <a:rPr lang="en-US" sz="1400" dirty="0">
+                  <a:solidFill>
+                    <a:schemeClr val="tx1"/>
+                  </a:solidFill>
+                  <a:latin typeface="Arial" panose="020B0604020202020204" pitchFamily="34" charset="0"/>
+                  <a:cs typeface="Arial" panose="020B0604020202020204" pitchFamily="34" charset="0"/>
+                </a:rPr>
+                <a:t>Role2 – </a:t>
+              </a:r>
+              <a:r>
+                <a:rPr lang="en-US" sz="1400" dirty="0" err="1">
+                  <a:solidFill>
+                    <a:schemeClr val="tx1"/>
+                  </a:solidFill>
+                  <a:latin typeface="Arial" panose="020B0604020202020204" pitchFamily="34" charset="0"/>
+                  <a:cs typeface="Arial" panose="020B0604020202020204" pitchFamily="34" charset="0"/>
+                </a:rPr>
+                <a:t>RecordRight.Insert</a:t>
+              </a:r>
+              <a:r>
+                <a:rPr lang="en-US" sz="1400" dirty="0">
+                  <a:solidFill>
+                    <a:schemeClr val="tx1"/>
+                  </a:solidFill>
+                  <a:latin typeface="Arial" panose="020B0604020202020204" pitchFamily="34" charset="0"/>
+                  <a:cs typeface="Arial" panose="020B0604020202020204" pitchFamily="34" charset="0"/>
+                </a:rPr>
+                <a:t> | Update</a:t>
+              </a:r>
+            </a:p>
+          </p:txBody>
+        </p:sp>
+        <p:sp>
+          <p:nvSpPr>
+            <p:cNvPr id="29" name="TextBox 28">
+              <a:extLst>
+                <a:ext uri="{FF2B5EF4-FFF2-40B4-BE49-F238E27FC236}">
+                  <a16:creationId xmlns:a16="http://schemas.microsoft.com/office/drawing/2014/main" id="{7FCFBBC4-1509-4FB2-8266-62C66DD22E55}"/>
+                </a:ext>
+              </a:extLst>
+            </p:cNvPr>
+            <p:cNvSpPr txBox="1"/>
+            <p:nvPr/>
+          </p:nvSpPr>
+          <p:spPr>
+            <a:xfrm>
+              <a:off x="7798872" y="755242"/>
+              <a:ext cx="2577950" cy="461665"/>
+            </a:xfrm>
+            <a:prstGeom prst="rect">
+              <a:avLst/>
+            </a:prstGeom>
+            <a:noFill/>
+          </p:spPr>
+          <p:txBody>
+            <a:bodyPr wrap="none" rtlCol="0">
+              <a:spAutoFit/>
+            </a:bodyPr>
+            <a:lstStyle/>
+            <a:p>
+              <a:r>
+                <a:rPr lang="en-US" sz="1200" dirty="0">
+                  <a:solidFill>
+                    <a:schemeClr val="accent2"/>
+                  </a:solidFill>
+                  <a:latin typeface="Arial" panose="020B0604020202020204" pitchFamily="34" charset="0"/>
+                  <a:cs typeface="Arial" panose="020B0604020202020204" pitchFamily="34" charset="0"/>
+                </a:rPr>
+                <a:t>Ace does not propagate –</a:t>
+              </a:r>
+            </a:p>
+            <a:p>
+              <a:r>
+                <a:rPr lang="en-US" sz="1200" dirty="0">
+                  <a:solidFill>
+                    <a:schemeClr val="accent2"/>
+                  </a:solidFill>
+                  <a:latin typeface="Arial" panose="020B0604020202020204" pitchFamily="34" charset="0"/>
+                  <a:cs typeface="Arial" panose="020B0604020202020204" pitchFamily="34" charset="0"/>
+                </a:rPr>
+                <a:t>individually configured not to inherit</a:t>
+              </a:r>
+            </a:p>
+          </p:txBody>
+        </p:sp>
+        <p:grpSp>
+          <p:nvGrpSpPr>
+            <p:cNvPr id="36" name="Group 35">
+              <a:extLst>
+                <a:ext uri="{FF2B5EF4-FFF2-40B4-BE49-F238E27FC236}">
+                  <a16:creationId xmlns:a16="http://schemas.microsoft.com/office/drawing/2014/main" id="{359FAE1D-BD1D-4F9D-ACA2-83F5B33461BB}"/>
+                </a:ext>
+              </a:extLst>
+            </p:cNvPr>
+            <p:cNvGrpSpPr/>
+            <p:nvPr/>
+          </p:nvGrpSpPr>
+          <p:grpSpPr>
+            <a:xfrm>
+              <a:off x="9235952" y="1793857"/>
+              <a:ext cx="274320" cy="274320"/>
+              <a:chOff x="7913594" y="2117912"/>
+              <a:chExt cx="450476" cy="450476"/>
+            </a:xfrm>
+          </p:grpSpPr>
+          <p:sp>
+            <p:nvSpPr>
+              <p:cNvPr id="37" name="Oval 36">
+                <a:extLst>
+                  <a:ext uri="{FF2B5EF4-FFF2-40B4-BE49-F238E27FC236}">
+                    <a16:creationId xmlns:a16="http://schemas.microsoft.com/office/drawing/2014/main" id="{622679EF-03A7-4CD8-B428-BCAA33CF7892}"/>
+                  </a:ext>
+                </a:extLst>
+              </p:cNvPr>
+              <p:cNvSpPr/>
+              <p:nvPr/>
+            </p:nvSpPr>
+            <p:spPr>
+              <a:xfrm>
+                <a:off x="7913594" y="2117912"/>
+                <a:ext cx="450476" cy="450476"/>
+              </a:xfrm>
+              <a:prstGeom prst="ellipse">
+                <a:avLst/>
+              </a:prstGeom>
+              <a:solidFill>
+                <a:schemeClr val="bg1">
+                  <a:lumMod val="95000"/>
+                </a:schemeClr>
+              </a:solidFill>
+              <a:ln w="25400">
+                <a:solidFill>
+                  <a:schemeClr val="accent2"/>
+                </a:solidFill>
+              </a:ln>
+            </p:spPr>
+            <p:style>
+              <a:lnRef idx="2">
+                <a:schemeClr val="accent1">
+                  <a:shade val="50000"/>
+                </a:schemeClr>
+              </a:lnRef>
+              <a:fillRef idx="1">
+                <a:schemeClr val="accent1"/>
+              </a:fillRef>
+              <a:effectRef idx="0">
+                <a:schemeClr val="accent1"/>
+              </a:effectRef>
+              <a:fontRef idx="minor">
+                <a:schemeClr val="lt1"/>
+              </a:fontRef>
+            </p:style>
+            <p:txBody>
+              <a:bodyPr rtlCol="0" anchor="ctr"/>
+              <a:lstStyle/>
+              <a:p>
+                <a:pPr algn="ctr"/>
+                <a:endParaRPr lang="en-US"/>
+              </a:p>
+            </p:txBody>
+          </p:sp>
+          <p:cxnSp>
+            <p:nvCxnSpPr>
+              <p:cNvPr id="38" name="Straight Connector 37">
+                <a:extLst>
+                  <a:ext uri="{FF2B5EF4-FFF2-40B4-BE49-F238E27FC236}">
+                    <a16:creationId xmlns:a16="http://schemas.microsoft.com/office/drawing/2014/main" id="{BFD6E759-9D38-4BB7-9086-AB94550168AE}"/>
+                  </a:ext>
+                </a:extLst>
+              </p:cNvPr>
+              <p:cNvCxnSpPr>
+                <a:cxnSpLocks/>
+                <a:stCxn id="37" idx="7"/>
+                <a:endCxn id="37" idx="3"/>
+              </p:cNvCxnSpPr>
+              <p:nvPr/>
+            </p:nvCxnSpPr>
+            <p:spPr>
+              <a:xfrm flipH="1">
+                <a:off x="7979565" y="2183883"/>
+                <a:ext cx="318534" cy="318534"/>
+              </a:xfrm>
+              <a:prstGeom prst="line">
+                <a:avLst/>
+              </a:prstGeom>
+              <a:ln w="25400">
+                <a:solidFill>
+                  <a:schemeClr val="accent2"/>
+                </a:solidFill>
+              </a:ln>
+            </p:spPr>
+            <p:style>
+              <a:lnRef idx="1">
+                <a:schemeClr val="accent1"/>
+              </a:lnRef>
+              <a:fillRef idx="0">
+                <a:schemeClr val="accent1"/>
+              </a:fillRef>
+              <a:effectRef idx="0">
+                <a:schemeClr val="accent1"/>
+              </a:effectRef>
+              <a:fontRef idx="minor">
+                <a:schemeClr val="tx1"/>
+              </a:fontRef>
+            </p:style>
+          </p:cxnSp>
+        </p:grpSp>
+        <p:sp>
+          <p:nvSpPr>
+            <p:cNvPr id="41" name="Rectangle 40">
+              <a:extLst>
+                <a:ext uri="{FF2B5EF4-FFF2-40B4-BE49-F238E27FC236}">
+                  <a16:creationId xmlns:a16="http://schemas.microsoft.com/office/drawing/2014/main" id="{7A0A49F4-5AF9-4BF4-96F8-E64602CAD926}"/>
+                </a:ext>
+              </a:extLst>
+            </p:cNvPr>
+            <p:cNvSpPr/>
+            <p:nvPr/>
+          </p:nvSpPr>
+          <p:spPr>
+            <a:xfrm>
+              <a:off x="6904889" y="3153832"/>
+              <a:ext cx="3108960" cy="256032"/>
+            </a:xfrm>
+            <a:prstGeom prst="rect">
+              <a:avLst/>
+            </a:prstGeom>
+            <a:solidFill>
+              <a:schemeClr val="accent6">
+                <a:lumMod val="20000"/>
+                <a:lumOff val="80000"/>
+              </a:schemeClr>
+            </a:solidFill>
+            <a:ln w="25400">
+              <a:solidFill>
+                <a:schemeClr val="accent6">
+                  <a:lumMod val="75000"/>
+                </a:schemeClr>
+              </a:solidFill>
+            </a:ln>
+          </p:spPr>
+          <p:style>
+            <a:lnRef idx="2">
+              <a:schemeClr val="accent1">
+                <a:shade val="50000"/>
+              </a:schemeClr>
+            </a:lnRef>
+            <a:fillRef idx="1">
+              <a:schemeClr val="accent1"/>
+            </a:fillRef>
+            <a:effectRef idx="0">
+              <a:schemeClr val="accent1"/>
+            </a:effectRef>
+            <a:fontRef idx="minor">
+              <a:schemeClr val="lt1"/>
+            </a:fontRef>
+          </p:style>
+          <p:txBody>
+            <a:bodyPr rtlCol="0" anchor="ctr"/>
+            <a:lstStyle/>
+            <a:p>
+              <a:r>
+                <a:rPr lang="en-US" sz="1100" dirty="0">
+                  <a:solidFill>
+                    <a:schemeClr val="tx1"/>
+                  </a:solidFill>
+                  <a:latin typeface="Arial" panose="020B0604020202020204" pitchFamily="34" charset="0"/>
+                  <a:cs typeface="Arial" panose="020B0604020202020204" pitchFamily="34" charset="0"/>
+                </a:rPr>
+                <a:t>Convert </a:t>
+              </a:r>
+              <a:r>
+                <a:rPr lang="en-US" sz="1100" dirty="0" err="1">
+                  <a:solidFill>
+                    <a:schemeClr val="tx1"/>
+                  </a:solidFill>
+                  <a:latin typeface="Arial" panose="020B0604020202020204" pitchFamily="34" charset="0"/>
+                  <a:cs typeface="Arial" panose="020B0604020202020204" pitchFamily="34" charset="0"/>
+                </a:rPr>
+                <a:t>RecordRight.Insert</a:t>
+              </a:r>
+              <a:r>
+                <a:rPr lang="en-US" sz="1100" dirty="0">
+                  <a:solidFill>
+                    <a:schemeClr val="tx1"/>
+                  </a:solidFill>
+                  <a:latin typeface="Arial" panose="020B0604020202020204" pitchFamily="34" charset="0"/>
+                  <a:cs typeface="Arial" panose="020B0604020202020204" pitchFamily="34" charset="0"/>
+                </a:rPr>
+                <a:t> </a:t>
+              </a:r>
+              <a:r>
+                <a:rPr lang="en-US" sz="1100" dirty="0">
+                  <a:solidFill>
+                    <a:schemeClr val="tx1"/>
+                  </a:solidFill>
+                  <a:latin typeface="Arial" panose="020B0604020202020204" pitchFamily="34" charset="0"/>
+                  <a:cs typeface="Arial" panose="020B0604020202020204" pitchFamily="34" charset="0"/>
+                  <a:sym typeface="Wingdings" panose="05000000000000000000" pitchFamily="2" charset="2"/>
+                </a:rPr>
+                <a:t></a:t>
+              </a:r>
+              <a:r>
+                <a:rPr lang="en-US" sz="1100" dirty="0">
+                  <a:solidFill>
+                    <a:schemeClr val="tx1"/>
+                  </a:solidFill>
+                  <a:latin typeface="Arial" panose="020B0604020202020204" pitchFamily="34" charset="0"/>
+                  <a:cs typeface="Arial" panose="020B0604020202020204" pitchFamily="34" charset="0"/>
+                </a:rPr>
+                <a:t> </a:t>
+              </a:r>
+              <a:r>
+                <a:rPr lang="en-US" sz="1100" dirty="0" err="1">
+                  <a:solidFill>
+                    <a:schemeClr val="tx1"/>
+                  </a:solidFill>
+                  <a:latin typeface="Arial" panose="020B0604020202020204" pitchFamily="34" charset="0"/>
+                  <a:cs typeface="Arial" panose="020B0604020202020204" pitchFamily="34" charset="0"/>
+                </a:rPr>
+                <a:t>UIRight.Enabled</a:t>
+              </a:r>
+              <a:endParaRPr lang="en-US" sz="1100" dirty="0">
+                <a:solidFill>
+                  <a:schemeClr val="tx1"/>
+                </a:solidFill>
+                <a:latin typeface="Arial" panose="020B0604020202020204" pitchFamily="34" charset="0"/>
+                <a:cs typeface="Arial" panose="020B0604020202020204" pitchFamily="34" charset="0"/>
+              </a:endParaRPr>
+            </a:p>
+          </p:txBody>
+        </p:sp>
+        <p:sp>
+          <p:nvSpPr>
+            <p:cNvPr id="50" name="Rectangle 49">
+              <a:extLst>
+                <a:ext uri="{FF2B5EF4-FFF2-40B4-BE49-F238E27FC236}">
+                  <a16:creationId xmlns:a16="http://schemas.microsoft.com/office/drawing/2014/main" id="{3D1B66CF-8078-4007-A335-995521066077}"/>
+                </a:ext>
+              </a:extLst>
+            </p:cNvPr>
+            <p:cNvSpPr/>
+            <p:nvPr/>
+          </p:nvSpPr>
+          <p:spPr>
+            <a:xfrm>
+              <a:off x="2080847" y="886573"/>
+              <a:ext cx="1994810" cy="1371599"/>
+            </a:xfrm>
+            <a:prstGeom prst="rect">
+              <a:avLst/>
+            </a:prstGeom>
+            <a:solidFill>
+              <a:schemeClr val="bg1">
+                <a:lumMod val="85000"/>
+              </a:schemeClr>
+            </a:solidFill>
+            <a:ln w="25400">
+              <a:solidFill>
+                <a:schemeClr val="bg1">
+                  <a:lumMod val="65000"/>
+                </a:schemeClr>
+              </a:solidFill>
+            </a:ln>
+          </p:spPr>
+          <p:style>
+            <a:lnRef idx="2">
+              <a:schemeClr val="dk1"/>
+            </a:lnRef>
+            <a:fillRef idx="1">
+              <a:schemeClr val="lt1"/>
+            </a:fillRef>
+            <a:effectRef idx="0">
+              <a:schemeClr val="dk1"/>
+            </a:effectRef>
+            <a:fontRef idx="minor">
+              <a:schemeClr val="dk1"/>
+            </a:fontRef>
+          </p:style>
+          <p:txBody>
+            <a:bodyPr rtlCol="0" anchor="t"/>
+            <a:lstStyle/>
+            <a:p>
+              <a:pPr algn="ctr"/>
+              <a:r>
+                <a:rPr lang="en-US" dirty="0">
+                  <a:latin typeface="Arial" panose="020B0604020202020204" pitchFamily="34" charset="0"/>
+                  <a:cs typeface="Arial" panose="020B0604020202020204" pitchFamily="34" charset="0"/>
+                </a:rPr>
+                <a:t>Role1</a:t>
+              </a:r>
+            </a:p>
+          </p:txBody>
+        </p:sp>
+        <p:grpSp>
+          <p:nvGrpSpPr>
+            <p:cNvPr id="24" name="Group 23">
+              <a:extLst>
+                <a:ext uri="{FF2B5EF4-FFF2-40B4-BE49-F238E27FC236}">
+                  <a16:creationId xmlns:a16="http://schemas.microsoft.com/office/drawing/2014/main" id="{A1978F20-44D8-48CE-8C4A-DF016DCA9BB0}"/>
+                </a:ext>
+              </a:extLst>
+            </p:cNvPr>
+            <p:cNvGrpSpPr/>
+            <p:nvPr/>
+          </p:nvGrpSpPr>
+          <p:grpSpPr>
+            <a:xfrm>
+              <a:off x="2112579" y="1237923"/>
+              <a:ext cx="914400" cy="1036652"/>
+              <a:chOff x="2080846" y="2264463"/>
+              <a:chExt cx="914400" cy="1036652"/>
+            </a:xfrm>
+          </p:grpSpPr>
+          <p:pic>
+            <p:nvPicPr>
+              <p:cNvPr id="44" name="Graphic 43" descr="Users">
+                <a:extLst>
+                  <a:ext uri="{FF2B5EF4-FFF2-40B4-BE49-F238E27FC236}">
+                    <a16:creationId xmlns:a16="http://schemas.microsoft.com/office/drawing/2014/main" id="{0B50C769-461A-4AD2-8053-66AA8031C73B}"/>
+                  </a:ext>
+                </a:extLst>
+              </p:cNvPr>
+              <p:cNvPicPr>
+                <a:picLocks noChangeAspect="1"/>
+              </p:cNvPicPr>
+              <p:nvPr/>
+            </p:nvPicPr>
+            <p:blipFill>
+              <a:blip r:embed="rId2">
+                <a:extLst>
+                  <a:ext uri="{28A0092B-C50C-407E-A947-70E740481C1C}">
+                    <a14:useLocalDpi xmlns:a14="http://schemas.microsoft.com/office/drawing/2010/main" val="0"/>
+                  </a:ext>
+                  <a:ext uri="{96DAC541-7B7A-43D3-8B79-37D633B846F1}">
+                    <asvg:svgBlip xmlns:asvg="http://schemas.microsoft.com/office/drawing/2016/SVG/main" r:embed="rId3"/>
+                  </a:ext>
+                </a:extLst>
+              </a:blip>
+              <a:stretch>
+                <a:fillRect/>
+              </a:stretch>
+            </p:blipFill>
+            <p:spPr>
+              <a:xfrm>
+                <a:off x="2080846" y="2264463"/>
+                <a:ext cx="914400" cy="914400"/>
+              </a:xfrm>
+              <a:prstGeom prst="rect">
+                <a:avLst/>
+              </a:prstGeom>
+            </p:spPr>
+          </p:pic>
+          <p:sp>
+            <p:nvSpPr>
+              <p:cNvPr id="21" name="TextBox 20">
+                <a:extLst>
+                  <a:ext uri="{FF2B5EF4-FFF2-40B4-BE49-F238E27FC236}">
+                    <a16:creationId xmlns:a16="http://schemas.microsoft.com/office/drawing/2014/main" id="{47CE6015-B4C8-47FF-9D75-0C3F920E1C98}"/>
+                  </a:ext>
+                </a:extLst>
+              </p:cNvPr>
+              <p:cNvSpPr txBox="1"/>
+              <p:nvPr/>
+            </p:nvSpPr>
+            <p:spPr>
+              <a:xfrm>
+                <a:off x="2147554" y="2993338"/>
+                <a:ext cx="780983" cy="307777"/>
+              </a:xfrm>
+              <a:prstGeom prst="rect">
+                <a:avLst/>
+              </a:prstGeom>
+              <a:noFill/>
+              <a:ln>
+                <a:noFill/>
+              </a:ln>
+            </p:spPr>
+            <p:style>
+              <a:lnRef idx="0">
+                <a:scrgbClr r="0" g="0" b="0"/>
+              </a:lnRef>
+              <a:fillRef idx="0">
+                <a:scrgbClr r="0" g="0" b="0"/>
+              </a:fillRef>
+              <a:effectRef idx="0">
+                <a:scrgbClr r="0" g="0" b="0"/>
+              </a:effectRef>
+              <a:fontRef idx="minor">
+                <a:schemeClr val="dk1"/>
+              </a:fontRef>
+            </p:style>
+            <p:txBody>
+              <a:bodyPr wrap="none" rtlCol="0">
+                <a:spAutoFit/>
+              </a:bodyPr>
+              <a:lstStyle/>
+              <a:p>
+                <a:r>
+                  <a:rPr lang="en-US" sz="1400" dirty="0">
+                    <a:latin typeface="Arial" panose="020B0604020202020204" pitchFamily="34" charset="0"/>
+                    <a:cs typeface="Arial" panose="020B0604020202020204" pitchFamily="34" charset="0"/>
+                  </a:rPr>
+                  <a:t>Group1</a:t>
+                </a:r>
+                <a:endParaRPr lang="en-US" dirty="0">
+                  <a:latin typeface="Arial" panose="020B0604020202020204" pitchFamily="34" charset="0"/>
+                  <a:cs typeface="Arial" panose="020B0604020202020204" pitchFamily="34" charset="0"/>
+                </a:endParaRPr>
+              </a:p>
+            </p:txBody>
+          </p:sp>
+        </p:grpSp>
+        <p:grpSp>
+          <p:nvGrpSpPr>
+            <p:cNvPr id="22" name="Group 21">
+              <a:extLst>
+                <a:ext uri="{FF2B5EF4-FFF2-40B4-BE49-F238E27FC236}">
+                  <a16:creationId xmlns:a16="http://schemas.microsoft.com/office/drawing/2014/main" id="{21B86CA8-4AC8-4976-BAC7-8DCC25D9AFF5}"/>
+                </a:ext>
+              </a:extLst>
+            </p:cNvPr>
+            <p:cNvGrpSpPr/>
+            <p:nvPr/>
+          </p:nvGrpSpPr>
+          <p:grpSpPr>
+            <a:xfrm>
+              <a:off x="3137809" y="1237923"/>
+              <a:ext cx="914400" cy="1036652"/>
+              <a:chOff x="3243860" y="2345746"/>
+              <a:chExt cx="914400" cy="1036652"/>
+            </a:xfrm>
+          </p:grpSpPr>
+          <p:pic>
+            <p:nvPicPr>
+              <p:cNvPr id="52" name="Graphic 51" descr="Users">
+                <a:extLst>
+                  <a:ext uri="{FF2B5EF4-FFF2-40B4-BE49-F238E27FC236}">
+                    <a16:creationId xmlns:a16="http://schemas.microsoft.com/office/drawing/2014/main" id="{FD0C4900-5112-4B88-B88A-3FC5BB8950B8}"/>
+                  </a:ext>
+                </a:extLst>
+              </p:cNvPr>
+              <p:cNvPicPr>
+                <a:picLocks noChangeAspect="1"/>
+              </p:cNvPicPr>
+              <p:nvPr/>
+            </p:nvPicPr>
+            <p:blipFill>
+              <a:blip r:embed="rId4">
+                <a:extLst>
+                  <a:ext uri="{28A0092B-C50C-407E-A947-70E740481C1C}">
+                    <a14:useLocalDpi xmlns:a14="http://schemas.microsoft.com/office/drawing/2010/main" val="0"/>
+                  </a:ext>
+                  <a:ext uri="{96DAC541-7B7A-43D3-8B79-37D633B846F1}">
+                    <asvg:svgBlip xmlns:asvg="http://schemas.microsoft.com/office/drawing/2016/SVG/main" r:embed="rId5"/>
+                  </a:ext>
+                </a:extLst>
+              </a:blip>
+              <a:stretch>
+                <a:fillRect/>
+              </a:stretch>
+            </p:blipFill>
+            <p:spPr>
+              <a:xfrm>
+                <a:off x="3243860" y="2345746"/>
+                <a:ext cx="914400" cy="914400"/>
+              </a:xfrm>
+              <a:prstGeom prst="rect">
+                <a:avLst/>
+              </a:prstGeom>
+            </p:spPr>
+          </p:pic>
+          <p:sp>
+            <p:nvSpPr>
+              <p:cNvPr id="53" name="TextBox 52">
+                <a:extLst>
+                  <a:ext uri="{FF2B5EF4-FFF2-40B4-BE49-F238E27FC236}">
+                    <a16:creationId xmlns:a16="http://schemas.microsoft.com/office/drawing/2014/main" id="{2483AF08-CC7B-4643-B13A-E473F0671C87}"/>
+                  </a:ext>
+                </a:extLst>
+              </p:cNvPr>
+              <p:cNvSpPr txBox="1"/>
+              <p:nvPr/>
+            </p:nvSpPr>
+            <p:spPr>
+              <a:xfrm>
+                <a:off x="3310568" y="3074621"/>
+                <a:ext cx="780983" cy="307777"/>
+              </a:xfrm>
+              <a:prstGeom prst="rect">
+                <a:avLst/>
+              </a:prstGeom>
+              <a:noFill/>
+              <a:ln>
+                <a:noFill/>
+              </a:ln>
+            </p:spPr>
+            <p:style>
+              <a:lnRef idx="0">
+                <a:scrgbClr r="0" g="0" b="0"/>
+              </a:lnRef>
+              <a:fillRef idx="0">
+                <a:scrgbClr r="0" g="0" b="0"/>
+              </a:fillRef>
+              <a:effectRef idx="0">
+                <a:scrgbClr r="0" g="0" b="0"/>
+              </a:effectRef>
+              <a:fontRef idx="minor">
+                <a:schemeClr val="dk1"/>
+              </a:fontRef>
+            </p:style>
+            <p:txBody>
+              <a:bodyPr wrap="none" rtlCol="0">
+                <a:spAutoFit/>
+              </a:bodyPr>
+              <a:lstStyle/>
+              <a:p>
+                <a:r>
+                  <a:rPr lang="en-US" sz="1400" dirty="0">
+                    <a:latin typeface="Arial" panose="020B0604020202020204" pitchFamily="34" charset="0"/>
+                    <a:cs typeface="Arial" panose="020B0604020202020204" pitchFamily="34" charset="0"/>
+                  </a:rPr>
+                  <a:t>Group2</a:t>
+                </a:r>
+                <a:endParaRPr lang="en-US" dirty="0">
+                  <a:latin typeface="Arial" panose="020B0604020202020204" pitchFamily="34" charset="0"/>
+                  <a:cs typeface="Arial" panose="020B0604020202020204" pitchFamily="34" charset="0"/>
+                </a:endParaRPr>
+              </a:p>
+            </p:txBody>
+          </p:sp>
+        </p:grpSp>
+        <p:grpSp>
+          <p:nvGrpSpPr>
+            <p:cNvPr id="54" name="Group 53">
+              <a:extLst>
+                <a:ext uri="{FF2B5EF4-FFF2-40B4-BE49-F238E27FC236}">
+                  <a16:creationId xmlns:a16="http://schemas.microsoft.com/office/drawing/2014/main" id="{635E61C4-0B32-4ED8-9CFE-124F7511C25F}"/>
+                </a:ext>
+              </a:extLst>
+            </p:cNvPr>
+            <p:cNvGrpSpPr/>
+            <p:nvPr/>
+          </p:nvGrpSpPr>
+          <p:grpSpPr>
+            <a:xfrm>
+              <a:off x="1618940" y="2249820"/>
+              <a:ext cx="914400" cy="1036652"/>
+              <a:chOff x="2080846" y="2264463"/>
+              <a:chExt cx="914400" cy="1036652"/>
+            </a:xfrm>
+          </p:grpSpPr>
+          <p:pic>
+            <p:nvPicPr>
+              <p:cNvPr id="55" name="Graphic 54" descr="Users">
+                <a:extLst>
+                  <a:ext uri="{FF2B5EF4-FFF2-40B4-BE49-F238E27FC236}">
+                    <a16:creationId xmlns:a16="http://schemas.microsoft.com/office/drawing/2014/main" id="{A9B44502-0D0D-4D24-A9C8-325F5FAF99EB}"/>
+                  </a:ext>
+                </a:extLst>
+              </p:cNvPr>
+              <p:cNvPicPr>
+                <a:picLocks noChangeAspect="1"/>
+              </p:cNvPicPr>
+              <p:nvPr/>
+            </p:nvPicPr>
+            <p:blipFill>
+              <a:blip r:embed="rId6">
+                <a:extLst>
+                  <a:ext uri="{28A0092B-C50C-407E-A947-70E740481C1C}">
+                    <a14:useLocalDpi xmlns:a14="http://schemas.microsoft.com/office/drawing/2010/main" val="0"/>
+                  </a:ext>
+                  <a:ext uri="{96DAC541-7B7A-43D3-8B79-37D633B846F1}">
+                    <asvg:svgBlip xmlns:asvg="http://schemas.microsoft.com/office/drawing/2016/SVG/main" r:embed="rId7"/>
+                  </a:ext>
+                </a:extLst>
+              </a:blip>
+              <a:stretch>
+                <a:fillRect/>
+              </a:stretch>
+            </p:blipFill>
+            <p:spPr>
+              <a:xfrm>
+                <a:off x="2080846" y="2264463"/>
+                <a:ext cx="914400" cy="914400"/>
+              </a:xfrm>
+              <a:prstGeom prst="rect">
+                <a:avLst/>
+              </a:prstGeom>
+            </p:spPr>
+          </p:pic>
+          <p:sp>
+            <p:nvSpPr>
+              <p:cNvPr id="56" name="TextBox 55">
+                <a:extLst>
+                  <a:ext uri="{FF2B5EF4-FFF2-40B4-BE49-F238E27FC236}">
+                    <a16:creationId xmlns:a16="http://schemas.microsoft.com/office/drawing/2014/main" id="{EB9708A2-A863-49ED-B4E8-17D82A2FD9AF}"/>
+                  </a:ext>
+                </a:extLst>
+              </p:cNvPr>
+              <p:cNvSpPr txBox="1"/>
+              <p:nvPr/>
+            </p:nvSpPr>
+            <p:spPr>
+              <a:xfrm>
+                <a:off x="2147554" y="2993338"/>
+                <a:ext cx="780983" cy="307777"/>
+              </a:xfrm>
+              <a:prstGeom prst="rect">
+                <a:avLst/>
+              </a:prstGeom>
+              <a:noFill/>
+              <a:ln>
+                <a:noFill/>
+              </a:ln>
+            </p:spPr>
+            <p:style>
+              <a:lnRef idx="0">
+                <a:scrgbClr r="0" g="0" b="0"/>
+              </a:lnRef>
+              <a:fillRef idx="0">
+                <a:scrgbClr r="0" g="0" b="0"/>
+              </a:fillRef>
+              <a:effectRef idx="0">
+                <a:scrgbClr r="0" g="0" b="0"/>
+              </a:effectRef>
+              <a:fontRef idx="minor">
+                <a:schemeClr val="dk1"/>
+              </a:fontRef>
+            </p:style>
+            <p:txBody>
+              <a:bodyPr wrap="none" rtlCol="0">
+                <a:spAutoFit/>
+              </a:bodyPr>
+              <a:lstStyle/>
+              <a:p>
+                <a:r>
+                  <a:rPr lang="en-US" sz="1400" dirty="0">
+                    <a:latin typeface="Arial" panose="020B0604020202020204" pitchFamily="34" charset="0"/>
+                    <a:cs typeface="Arial" panose="020B0604020202020204" pitchFamily="34" charset="0"/>
+                  </a:rPr>
+                  <a:t>Group3</a:t>
+                </a:r>
+                <a:endParaRPr lang="en-US" dirty="0">
+                  <a:latin typeface="Arial" panose="020B0604020202020204" pitchFamily="34" charset="0"/>
+                  <a:cs typeface="Arial" panose="020B0604020202020204" pitchFamily="34" charset="0"/>
+                </a:endParaRPr>
+              </a:p>
+            </p:txBody>
+          </p:sp>
+        </p:grpSp>
+        <p:cxnSp>
+          <p:nvCxnSpPr>
+            <p:cNvPr id="35" name="Straight Arrow Connector 34">
+              <a:extLst>
+                <a:ext uri="{FF2B5EF4-FFF2-40B4-BE49-F238E27FC236}">
+                  <a16:creationId xmlns:a16="http://schemas.microsoft.com/office/drawing/2014/main" id="{C9594C8E-C0C9-4EC2-8D8C-A06392506262}"/>
+                </a:ext>
+              </a:extLst>
+            </p:cNvPr>
+            <p:cNvCxnSpPr>
+              <a:cxnSpLocks/>
+              <a:stCxn id="55" idx="1"/>
+              <a:endCxn id="44" idx="1"/>
+            </p:cNvCxnSpPr>
+            <p:nvPr/>
+          </p:nvCxnSpPr>
+          <p:spPr>
+            <a:xfrm rot="10800000" flipH="1">
+              <a:off x="1618939" y="1695124"/>
+              <a:ext cx="493639" cy="1011897"/>
+            </a:xfrm>
+            <a:prstGeom prst="curvedConnector3">
+              <a:avLst>
+                <a:gd name="adj1" fmla="val -16624"/>
+              </a:avLst>
+            </a:prstGeom>
+            <a:ln w="25400" cap="flat" cmpd="sng" algn="ctr">
+              <a:solidFill>
+                <a:schemeClr val="accent3">
+                  <a:lumMod val="60000"/>
+                  <a:lumOff val="40000"/>
+                </a:schemeClr>
+              </a:solidFill>
+              <a:prstDash val="solid"/>
+              <a:round/>
+              <a:headEnd type="none" w="med" len="med"/>
+              <a:tailEnd type="arrow" w="med" len="med"/>
+            </a:ln>
+          </p:spPr>
+          <p:style>
+            <a:lnRef idx="0">
+              <a:scrgbClr r="0" g="0" b="0"/>
+            </a:lnRef>
+            <a:fillRef idx="0">
+              <a:scrgbClr r="0" g="0" b="0"/>
+            </a:fillRef>
+            <a:effectRef idx="0">
+              <a:scrgbClr r="0" g="0" b="0"/>
+            </a:effectRef>
+            <a:fontRef idx="minor">
+              <a:schemeClr val="tx1"/>
+            </a:fontRef>
+          </p:style>
+        </p:cxnSp>
+        <p:pic>
+          <p:nvPicPr>
+            <p:cNvPr id="59" name="Graphic 58" descr="User">
+              <a:extLst>
+                <a:ext uri="{FF2B5EF4-FFF2-40B4-BE49-F238E27FC236}">
+                  <a16:creationId xmlns:a16="http://schemas.microsoft.com/office/drawing/2014/main" id="{B71D43B7-7F46-49CD-AAA3-113C718A0936}"/>
+                </a:ext>
+              </a:extLst>
+            </p:cNvPr>
+            <p:cNvPicPr>
+              <a:picLocks noChangeAspect="1"/>
+            </p:cNvPicPr>
+            <p:nvPr/>
+          </p:nvPicPr>
+          <p:blipFill>
+            <a:blip r:embed="rId8">
+              <a:extLst>
+                <a:ext uri="{28A0092B-C50C-407E-A947-70E740481C1C}">
+                  <a14:useLocalDpi xmlns:a14="http://schemas.microsoft.com/office/drawing/2010/main" val="0"/>
+                </a:ext>
+                <a:ext uri="{96DAC541-7B7A-43D3-8B79-37D633B846F1}">
+                  <asvg:svgBlip xmlns:asvg="http://schemas.microsoft.com/office/drawing/2016/SVG/main" r:embed="rId9"/>
+                </a:ext>
+              </a:extLst>
+            </a:blip>
+            <a:stretch>
+              <a:fillRect/>
+            </a:stretch>
+          </p:blipFill>
+          <p:spPr>
+            <a:xfrm>
+              <a:off x="2418397" y="3252516"/>
+              <a:ext cx="554953" cy="554953"/>
+            </a:xfrm>
+            <a:prstGeom prst="rect">
+              <a:avLst/>
+            </a:prstGeom>
+          </p:spPr>
+        </p:pic>
+        <p:pic>
+          <p:nvPicPr>
+            <p:cNvPr id="60" name="Graphic 59" descr="User">
+              <a:extLst>
+                <a:ext uri="{FF2B5EF4-FFF2-40B4-BE49-F238E27FC236}">
+                  <a16:creationId xmlns:a16="http://schemas.microsoft.com/office/drawing/2014/main" id="{93ABDFC7-DE6B-458B-871C-E850682549F9}"/>
+                </a:ext>
+              </a:extLst>
+            </p:cNvPr>
+            <p:cNvPicPr>
+              <a:picLocks noChangeAspect="1"/>
+            </p:cNvPicPr>
+            <p:nvPr/>
+          </p:nvPicPr>
+          <p:blipFill>
+            <a:blip r:embed="rId10">
+              <a:extLst>
+                <a:ext uri="{28A0092B-C50C-407E-A947-70E740481C1C}">
+                  <a14:useLocalDpi xmlns:a14="http://schemas.microsoft.com/office/drawing/2010/main" val="0"/>
+                </a:ext>
+                <a:ext uri="{96DAC541-7B7A-43D3-8B79-37D633B846F1}">
+                  <asvg:svgBlip xmlns:asvg="http://schemas.microsoft.com/office/drawing/2016/SVG/main" r:embed="rId11"/>
+                </a:ext>
+              </a:extLst>
+            </a:blip>
+            <a:stretch>
+              <a:fillRect/>
+            </a:stretch>
+          </p:blipFill>
+          <p:spPr>
+            <a:xfrm>
+              <a:off x="2926670" y="2886743"/>
+              <a:ext cx="554953" cy="554953"/>
+            </a:xfrm>
+            <a:prstGeom prst="rect">
+              <a:avLst/>
+            </a:prstGeom>
+          </p:spPr>
+        </p:pic>
+        <p:pic>
+          <p:nvPicPr>
+            <p:cNvPr id="61" name="Graphic 60" descr="User">
+              <a:extLst>
+                <a:ext uri="{FF2B5EF4-FFF2-40B4-BE49-F238E27FC236}">
+                  <a16:creationId xmlns:a16="http://schemas.microsoft.com/office/drawing/2014/main" id="{97935678-B436-4F83-B725-27B9AC2A97B0}"/>
+                </a:ext>
+              </a:extLst>
+            </p:cNvPr>
+            <p:cNvPicPr>
+              <a:picLocks noChangeAspect="1"/>
+            </p:cNvPicPr>
+            <p:nvPr/>
+          </p:nvPicPr>
+          <p:blipFill>
+            <a:blip r:embed="rId12">
+              <a:extLst>
+                <a:ext uri="{28A0092B-C50C-407E-A947-70E740481C1C}">
+                  <a14:useLocalDpi xmlns:a14="http://schemas.microsoft.com/office/drawing/2010/main" val="0"/>
+                </a:ext>
+                <a:ext uri="{96DAC541-7B7A-43D3-8B79-37D633B846F1}">
+                  <asvg:svgBlip xmlns:asvg="http://schemas.microsoft.com/office/drawing/2016/SVG/main" r:embed="rId13"/>
+                </a:ext>
+              </a:extLst>
+            </a:blip>
+            <a:stretch>
+              <a:fillRect/>
+            </a:stretch>
+          </p:blipFill>
+          <p:spPr>
+            <a:xfrm>
+              <a:off x="3444205" y="2746568"/>
+              <a:ext cx="554953" cy="554953"/>
+            </a:xfrm>
+            <a:prstGeom prst="rect">
+              <a:avLst/>
+            </a:prstGeom>
+          </p:spPr>
+        </p:pic>
+        <p:cxnSp>
+          <p:nvCxnSpPr>
+            <p:cNvPr id="63" name="Straight Arrow Connector 62">
+              <a:extLst>
+                <a:ext uri="{FF2B5EF4-FFF2-40B4-BE49-F238E27FC236}">
+                  <a16:creationId xmlns:a16="http://schemas.microsoft.com/office/drawing/2014/main" id="{5E42BB38-477B-40FA-9480-7875506118CA}"/>
+                </a:ext>
+              </a:extLst>
+            </p:cNvPr>
+            <p:cNvCxnSpPr>
+              <a:cxnSpLocks/>
+            </p:cNvCxnSpPr>
+            <p:nvPr/>
+          </p:nvCxnSpPr>
+          <p:spPr>
+            <a:xfrm flipH="1" flipV="1">
+              <a:off x="2329082" y="3228274"/>
+              <a:ext cx="137549" cy="181591"/>
+            </a:xfrm>
+            <a:prstGeom prst="straightConnector1">
+              <a:avLst/>
+            </a:prstGeom>
+            <a:ln w="25400">
+              <a:solidFill>
+                <a:schemeClr val="accent3">
+                  <a:lumMod val="60000"/>
+                  <a:lumOff val="40000"/>
+                </a:schemeClr>
+              </a:solidFill>
+              <a:tailEnd type="triangle"/>
+            </a:ln>
+          </p:spPr>
+          <p:style>
+            <a:lnRef idx="1">
+              <a:schemeClr val="accent1"/>
+            </a:lnRef>
+            <a:fillRef idx="0">
+              <a:schemeClr val="accent1"/>
+            </a:fillRef>
+            <a:effectRef idx="0">
+              <a:schemeClr val="accent1"/>
+            </a:effectRef>
+            <a:fontRef idx="minor">
+              <a:schemeClr val="tx1"/>
+            </a:fontRef>
+          </p:style>
+        </p:cxnSp>
+        <p:cxnSp>
+          <p:nvCxnSpPr>
+            <p:cNvPr id="64" name="Straight Arrow Connector 63">
+              <a:extLst>
+                <a:ext uri="{FF2B5EF4-FFF2-40B4-BE49-F238E27FC236}">
+                  <a16:creationId xmlns:a16="http://schemas.microsoft.com/office/drawing/2014/main" id="{6ADBA59F-FF9C-4922-8FA2-CAFC5806D625}"/>
+                </a:ext>
+              </a:extLst>
+            </p:cNvPr>
+            <p:cNvCxnSpPr>
+              <a:cxnSpLocks/>
+            </p:cNvCxnSpPr>
+            <p:nvPr/>
+          </p:nvCxnSpPr>
+          <p:spPr>
+            <a:xfrm flipH="1" flipV="1">
+              <a:off x="2679033" y="2274575"/>
+              <a:ext cx="347946" cy="749979"/>
+            </a:xfrm>
+            <a:prstGeom prst="straightConnector1">
+              <a:avLst/>
+            </a:prstGeom>
+            <a:ln w="25400">
+              <a:solidFill>
+                <a:schemeClr val="accent6">
+                  <a:lumMod val="60000"/>
+                  <a:lumOff val="40000"/>
+                </a:schemeClr>
+              </a:solidFill>
+              <a:tailEnd type="triangle"/>
+            </a:ln>
+          </p:spPr>
+          <p:style>
+            <a:lnRef idx="1">
+              <a:schemeClr val="accent1"/>
+            </a:lnRef>
+            <a:fillRef idx="0">
+              <a:schemeClr val="accent1"/>
+            </a:fillRef>
+            <a:effectRef idx="0">
+              <a:schemeClr val="accent1"/>
+            </a:effectRef>
+            <a:fontRef idx="minor">
+              <a:schemeClr val="tx1"/>
+            </a:fontRef>
+          </p:style>
+        </p:cxnSp>
+        <p:cxnSp>
+          <p:nvCxnSpPr>
+            <p:cNvPr id="69" name="Straight Arrow Connector 68">
+              <a:extLst>
+                <a:ext uri="{FF2B5EF4-FFF2-40B4-BE49-F238E27FC236}">
+                  <a16:creationId xmlns:a16="http://schemas.microsoft.com/office/drawing/2014/main" id="{B1E175FC-6B44-4C82-AB3A-172443155309}"/>
+                </a:ext>
+              </a:extLst>
+            </p:cNvPr>
+            <p:cNvCxnSpPr>
+              <a:cxnSpLocks/>
+              <a:stCxn id="61" idx="0"/>
+              <a:endCxn id="53" idx="2"/>
+            </p:cNvCxnSpPr>
+            <p:nvPr/>
+          </p:nvCxnSpPr>
+          <p:spPr>
+            <a:xfrm flipH="1" flipV="1">
+              <a:off x="3595009" y="2274575"/>
+              <a:ext cx="126673" cy="471993"/>
+            </a:xfrm>
+            <a:prstGeom prst="straightConnector1">
+              <a:avLst/>
+            </a:prstGeom>
+            <a:ln w="25400">
+              <a:solidFill>
+                <a:schemeClr val="accent5">
+                  <a:lumMod val="60000"/>
+                  <a:lumOff val="40000"/>
+                </a:schemeClr>
+              </a:solidFill>
+              <a:tailEnd type="triangle"/>
+            </a:ln>
+          </p:spPr>
+          <p:style>
+            <a:lnRef idx="1">
+              <a:schemeClr val="accent1"/>
+            </a:lnRef>
+            <a:fillRef idx="0">
+              <a:schemeClr val="accent1"/>
+            </a:fillRef>
+            <a:effectRef idx="0">
+              <a:schemeClr val="accent1"/>
+            </a:effectRef>
+            <a:fontRef idx="minor">
+              <a:schemeClr val="tx1"/>
+            </a:fontRef>
+          </p:style>
+        </p:cxnSp>
+        <p:cxnSp>
+          <p:nvCxnSpPr>
+            <p:cNvPr id="85" name="Straight Arrow Connector 84">
+              <a:extLst>
+                <a:ext uri="{FF2B5EF4-FFF2-40B4-BE49-F238E27FC236}">
+                  <a16:creationId xmlns:a16="http://schemas.microsoft.com/office/drawing/2014/main" id="{35530FFF-DFDB-468A-B24C-ABB02289812B}"/>
+                </a:ext>
+              </a:extLst>
+            </p:cNvPr>
+            <p:cNvCxnSpPr>
+              <a:cxnSpLocks/>
+              <a:endCxn id="26" idx="1"/>
+            </p:cNvCxnSpPr>
+            <p:nvPr/>
+          </p:nvCxnSpPr>
+          <p:spPr>
+            <a:xfrm rot="5400000" flipH="1" flipV="1">
+              <a:off x="3445098" y="2294384"/>
+              <a:ext cx="2672357" cy="1428688"/>
+            </a:xfrm>
+            <a:prstGeom prst="curvedConnector2">
+              <a:avLst/>
+            </a:prstGeom>
+            <a:ln w="25400">
+              <a:solidFill>
+                <a:schemeClr val="tx1">
+                  <a:lumMod val="85000"/>
+                  <a:lumOff val="15000"/>
+                </a:schemeClr>
+              </a:solidFill>
+              <a:tailEnd type="triangle"/>
+            </a:ln>
+          </p:spPr>
+          <p:style>
+            <a:lnRef idx="1">
+              <a:schemeClr val="accent1"/>
+            </a:lnRef>
+            <a:fillRef idx="0">
+              <a:schemeClr val="accent1"/>
+            </a:fillRef>
+            <a:effectRef idx="0">
+              <a:schemeClr val="accent1"/>
+            </a:effectRef>
+            <a:fontRef idx="minor">
+              <a:schemeClr val="tx1"/>
+            </a:fontRef>
+          </p:style>
+        </p:cxnSp>
+        <p:cxnSp>
+          <p:nvCxnSpPr>
+            <p:cNvPr id="87" name="Straight Arrow Connector 84">
+              <a:extLst>
+                <a:ext uri="{FF2B5EF4-FFF2-40B4-BE49-F238E27FC236}">
+                  <a16:creationId xmlns:a16="http://schemas.microsoft.com/office/drawing/2014/main" id="{3D104B40-CC5D-413F-9F30-94C2DBF7CE0E}"/>
+                </a:ext>
+              </a:extLst>
+            </p:cNvPr>
+            <p:cNvCxnSpPr>
+              <a:cxnSpLocks/>
+              <a:stCxn id="50" idx="3"/>
+              <a:endCxn id="30" idx="1"/>
+            </p:cNvCxnSpPr>
+            <p:nvPr/>
+          </p:nvCxnSpPr>
+          <p:spPr>
+            <a:xfrm flipV="1">
+              <a:off x="4075657" y="1364687"/>
+              <a:ext cx="1419963" cy="207686"/>
+            </a:xfrm>
+            <a:prstGeom prst="curvedConnector3">
+              <a:avLst>
+                <a:gd name="adj1" fmla="val 50000"/>
+              </a:avLst>
+            </a:prstGeom>
+            <a:ln w="25400">
+              <a:solidFill>
+                <a:schemeClr val="tx1">
+                  <a:lumMod val="85000"/>
+                  <a:lumOff val="15000"/>
+                </a:schemeClr>
+              </a:solidFill>
+              <a:tailEnd type="triangle"/>
+            </a:ln>
+          </p:spPr>
+          <p:style>
+            <a:lnRef idx="1">
+              <a:schemeClr val="accent1"/>
+            </a:lnRef>
+            <a:fillRef idx="0">
+              <a:schemeClr val="accent1"/>
+            </a:fillRef>
+            <a:effectRef idx="0">
+              <a:schemeClr val="accent1"/>
+            </a:effectRef>
+            <a:fontRef idx="minor">
+              <a:schemeClr val="tx1"/>
+            </a:fontRef>
+          </p:style>
+        </p:cxnSp>
+        <p:grpSp>
+          <p:nvGrpSpPr>
+            <p:cNvPr id="91" name="Group 90">
+              <a:extLst>
+                <a:ext uri="{FF2B5EF4-FFF2-40B4-BE49-F238E27FC236}">
+                  <a16:creationId xmlns:a16="http://schemas.microsoft.com/office/drawing/2014/main" id="{5D47B61F-0D3C-4528-BD4C-60576B71556C}"/>
+                </a:ext>
+              </a:extLst>
+            </p:cNvPr>
+            <p:cNvGrpSpPr/>
+            <p:nvPr/>
+          </p:nvGrpSpPr>
+          <p:grpSpPr>
+            <a:xfrm>
+              <a:off x="2072120" y="4279462"/>
+              <a:ext cx="1994810" cy="1410964"/>
+              <a:chOff x="2072120" y="4279462"/>
+              <a:chExt cx="1994810" cy="1410964"/>
+            </a:xfrm>
+          </p:grpSpPr>
+          <p:sp>
+            <p:nvSpPr>
+              <p:cNvPr id="51" name="Rectangle 50">
+                <a:extLst>
+                  <a:ext uri="{FF2B5EF4-FFF2-40B4-BE49-F238E27FC236}">
+                    <a16:creationId xmlns:a16="http://schemas.microsoft.com/office/drawing/2014/main" id="{2A22B241-0068-48D6-843B-7A5E72A8F53C}"/>
+                  </a:ext>
+                </a:extLst>
+              </p:cNvPr>
+              <p:cNvSpPr/>
+              <p:nvPr/>
+            </p:nvSpPr>
+            <p:spPr>
+              <a:xfrm>
+                <a:off x="2072120" y="4279462"/>
+                <a:ext cx="1994810" cy="1371599"/>
+              </a:xfrm>
+              <a:prstGeom prst="rect">
+                <a:avLst/>
+              </a:prstGeom>
+              <a:solidFill>
+                <a:schemeClr val="bg1">
+                  <a:lumMod val="85000"/>
+                </a:schemeClr>
+              </a:solidFill>
+              <a:ln w="25400">
+                <a:solidFill>
+                  <a:schemeClr val="bg1">
+                    <a:lumMod val="65000"/>
+                  </a:schemeClr>
+                </a:solidFill>
+              </a:ln>
+            </p:spPr>
+            <p:style>
+              <a:lnRef idx="2">
+                <a:schemeClr val="dk1"/>
+              </a:lnRef>
+              <a:fillRef idx="1">
+                <a:schemeClr val="lt1"/>
+              </a:fillRef>
+              <a:effectRef idx="0">
+                <a:schemeClr val="dk1"/>
+              </a:effectRef>
+              <a:fontRef idx="minor">
+                <a:schemeClr val="dk1"/>
+              </a:fontRef>
+            </p:style>
+            <p:txBody>
+              <a:bodyPr rtlCol="0" anchor="t"/>
+              <a:lstStyle/>
+              <a:p>
+                <a:pPr algn="ctr"/>
+                <a:r>
+                  <a:rPr lang="en-US" dirty="0">
+                    <a:latin typeface="Arial" panose="020B0604020202020204" pitchFamily="34" charset="0"/>
+                    <a:cs typeface="Arial" panose="020B0604020202020204" pitchFamily="34" charset="0"/>
+                  </a:rPr>
+                  <a:t>Role2</a:t>
+                </a:r>
+              </a:p>
+            </p:txBody>
+          </p:sp>
+          <p:grpSp>
+            <p:nvGrpSpPr>
+              <p:cNvPr id="78" name="Group 77">
+                <a:extLst>
+                  <a:ext uri="{FF2B5EF4-FFF2-40B4-BE49-F238E27FC236}">
+                    <a16:creationId xmlns:a16="http://schemas.microsoft.com/office/drawing/2014/main" id="{69735020-6691-4B78-83F3-DB1098281C6B}"/>
+                  </a:ext>
+                </a:extLst>
+              </p:cNvPr>
+              <p:cNvGrpSpPr/>
+              <p:nvPr/>
+            </p:nvGrpSpPr>
+            <p:grpSpPr>
+              <a:xfrm>
+                <a:off x="2612325" y="4653774"/>
+                <a:ext cx="914400" cy="1036652"/>
+                <a:chOff x="2080846" y="2264463"/>
+                <a:chExt cx="914400" cy="1036652"/>
+              </a:xfrm>
+            </p:grpSpPr>
+            <p:pic>
+              <p:nvPicPr>
+                <p:cNvPr id="79" name="Graphic 78" descr="Users">
+                  <a:extLst>
+                    <a:ext uri="{FF2B5EF4-FFF2-40B4-BE49-F238E27FC236}">
+                      <a16:creationId xmlns:a16="http://schemas.microsoft.com/office/drawing/2014/main" id="{2C3D47A8-6E68-4A43-903F-6088C3F7536A}"/>
+                    </a:ext>
+                  </a:extLst>
+                </p:cNvPr>
+                <p:cNvPicPr>
+                  <a:picLocks noChangeAspect="1"/>
+                </p:cNvPicPr>
+                <p:nvPr/>
+              </p:nvPicPr>
+              <p:blipFill>
+                <a:blip r:embed="rId14">
+                  <a:extLst>
+                    <a:ext uri="{28A0092B-C50C-407E-A947-70E740481C1C}">
+                      <a14:useLocalDpi xmlns:a14="http://schemas.microsoft.com/office/drawing/2010/main" val="0"/>
+                    </a:ext>
+                    <a:ext uri="{96DAC541-7B7A-43D3-8B79-37D633B846F1}">
+                      <asvg:svgBlip xmlns:asvg="http://schemas.microsoft.com/office/drawing/2016/SVG/main" r:embed="rId15"/>
+                    </a:ext>
+                  </a:extLst>
+                </a:blip>
+                <a:stretch>
+                  <a:fillRect/>
+                </a:stretch>
+              </p:blipFill>
+              <p:spPr>
+                <a:xfrm>
+                  <a:off x="2080846" y="2264463"/>
+                  <a:ext cx="914400" cy="914400"/>
+                </a:xfrm>
+                <a:prstGeom prst="rect">
+                  <a:avLst/>
+                </a:prstGeom>
+              </p:spPr>
+            </p:pic>
+            <p:sp>
+              <p:nvSpPr>
+                <p:cNvPr id="80" name="TextBox 79">
+                  <a:extLst>
+                    <a:ext uri="{FF2B5EF4-FFF2-40B4-BE49-F238E27FC236}">
+                      <a16:creationId xmlns:a16="http://schemas.microsoft.com/office/drawing/2014/main" id="{CCC3F200-C837-4951-BE83-CE6ABDCE9B79}"/>
+                    </a:ext>
+                  </a:extLst>
+                </p:cNvPr>
+                <p:cNvSpPr txBox="1"/>
+                <p:nvPr/>
+              </p:nvSpPr>
+              <p:spPr>
+                <a:xfrm>
+                  <a:off x="2147554" y="2993338"/>
+                  <a:ext cx="780983" cy="307777"/>
+                </a:xfrm>
+                <a:prstGeom prst="rect">
+                  <a:avLst/>
+                </a:prstGeom>
+                <a:noFill/>
+                <a:ln>
+                  <a:noFill/>
+                </a:ln>
+              </p:spPr>
+              <p:style>
+                <a:lnRef idx="0">
+                  <a:scrgbClr r="0" g="0" b="0"/>
+                </a:lnRef>
+                <a:fillRef idx="0">
+                  <a:scrgbClr r="0" g="0" b="0"/>
+                </a:fillRef>
+                <a:effectRef idx="0">
+                  <a:scrgbClr r="0" g="0" b="0"/>
+                </a:effectRef>
+                <a:fontRef idx="minor">
+                  <a:schemeClr val="dk1"/>
+                </a:fontRef>
+              </p:style>
+              <p:txBody>
+                <a:bodyPr wrap="none" rtlCol="0">
+                  <a:spAutoFit/>
+                </a:bodyPr>
+                <a:lstStyle/>
+                <a:p>
+                  <a:r>
+                    <a:rPr lang="en-US" sz="1400" dirty="0">
+                      <a:latin typeface="Arial" panose="020B0604020202020204" pitchFamily="34" charset="0"/>
+                      <a:cs typeface="Arial" panose="020B0604020202020204" pitchFamily="34" charset="0"/>
+                    </a:rPr>
+                    <a:t>Group4</a:t>
+                  </a:r>
+                  <a:endParaRPr lang="en-US" dirty="0">
+                    <a:latin typeface="Arial" panose="020B0604020202020204" pitchFamily="34" charset="0"/>
+                    <a:cs typeface="Arial" panose="020B0604020202020204" pitchFamily="34" charset="0"/>
+                  </a:endParaRPr>
+                </a:p>
+              </p:txBody>
+            </p:sp>
+          </p:grpSp>
+        </p:grpSp>
+      </p:grpSp>
+    </p:spTree>
+    <p:extLst>
+      <p:ext uri="{BB962C8B-B14F-4D97-AF65-F5344CB8AC3E}">
+        <p14:creationId xmlns:p14="http://schemas.microsoft.com/office/powerpoint/2010/main" val="1042806388"/>
+      </p:ext>
+    </p:extLst>
+  </p:cSld>
+  <p:clrMapOvr>
+    <a:masterClrMapping/>
+  </p:clrMapOvr>
+</p:sld>
+</file>
+
+<file path=ppt/slides/slide3.xml><?xml version="1.0" encoding="utf-8"?>
+<p:sld xmlns:a="http://schemas.openxmlformats.org/drawingml/2006/main" xmlns:r="http://schemas.openxmlformats.org/officeDocument/2006/relationships" xmlns:p="http://schemas.openxmlformats.org/presentationml/2006/main" showMasterSp="0">
+  <p:cSld>
+    <p:spTree>
+      <p:nvGrpSpPr>
+        <p:cNvPr id="1" name=""/>
+        <p:cNvGrpSpPr/>
+        <p:nvPr/>
+      </p:nvGrpSpPr>
+      <p:grpSpPr>
+        <a:xfrm>
+          <a:off x="0" y="0"/>
+          <a:ext cx="0" cy="0"/>
+          <a:chOff x="0" y="0"/>
+          <a:chExt cx="0" cy="0"/>
+        </a:xfrm>
+      </p:grpSpPr>
+      <p:grpSp>
+        <p:nvGrpSpPr>
           <p:cNvPr id="14" name="Group 13">
             <a:extLst>
               <a:ext uri="{FF2B5EF4-FFF2-40B4-BE49-F238E27FC236}">
@@ -20314,7 +22980,7 @@
     </p:spTree>
     <p:extLst>
       <p:ext uri="{BB962C8B-B14F-4D97-AF65-F5344CB8AC3E}">
-        <p14:creationId xmlns:p14="http://schemas.microsoft.com/office/powerpoint/2010/main" val="1042806388"/>
+        <p14:creationId xmlns:p14="http://schemas.microsoft.com/office/powerpoint/2010/main" val="3162597992"/>
       </p:ext>
     </p:extLst>
   </p:cSld>

</xml_diff>

<commit_message>
better draft of best prac
</commit_message>
<xml_diff>
--- a/docs/img/graphics.pptx
+++ b/docs/img/graphics.pptx
@@ -18911,10 +18911,10 @@
       </p:grpSpPr>
       <p:grpSp>
         <p:nvGrpSpPr>
-          <p:cNvPr id="93" name="Group 92">
+          <p:cNvPr id="16" name="Group 15">
             <a:extLst>
               <a:ext uri="{FF2B5EF4-FFF2-40B4-BE49-F238E27FC236}">
-                <a16:creationId xmlns:a16="http://schemas.microsoft.com/office/drawing/2014/main" id="{FCAE7010-EAC1-44F0-A177-62E53DE7305C}"/>
+                <a16:creationId xmlns:a16="http://schemas.microsoft.com/office/drawing/2014/main" id="{EFE10DF1-4DCA-474A-AFEB-C7E508730255}"/>
               </a:ext>
             </a:extLst>
           </p:cNvPr>
@@ -20509,74 +20509,12 @@
             </a:p>
           </p:txBody>
         </p:sp>
-        <p:sp>
-          <p:nvSpPr>
-            <p:cNvPr id="50" name="Rectangle 49">
+        <p:grpSp>
+          <p:nvGrpSpPr>
+            <p:cNvPr id="54" name="Group 53">
               <a:extLst>
                 <a:ext uri="{FF2B5EF4-FFF2-40B4-BE49-F238E27FC236}">
-                  <a16:creationId xmlns:a16="http://schemas.microsoft.com/office/drawing/2014/main" id="{3D1B66CF-8078-4007-A335-995521066077}"/>
-                </a:ext>
-              </a:extLst>
-            </p:cNvPr>
-            <p:cNvSpPr/>
-            <p:nvPr/>
-          </p:nvSpPr>
-          <p:spPr>
-            <a:xfrm>
-              <a:off x="2080847" y="886573"/>
-              <a:ext cx="1994810" cy="1371599"/>
-            </a:xfrm>
-            <a:prstGeom prst="rect">
-              <a:avLst/>
-            </a:prstGeom>
-            <a:solidFill>
-              <a:schemeClr val="bg1">
-                <a:lumMod val="85000"/>
-              </a:schemeClr>
-            </a:solidFill>
-            <a:ln w="25400">
-              <a:solidFill>
-                <a:schemeClr val="bg1">
-                  <a:lumMod val="65000"/>
-                </a:schemeClr>
-              </a:solidFill>
-            </a:ln>
-          </p:spPr>
-          <p:style>
-            <a:lnRef idx="2">
-              <a:schemeClr val="dk1"/>
-            </a:lnRef>
-            <a:fillRef idx="1">
-              <a:schemeClr val="lt1"/>
-            </a:fillRef>
-            <a:effectRef idx="0">
-              <a:schemeClr val="dk1"/>
-            </a:effectRef>
-            <a:fontRef idx="minor">
-              <a:schemeClr val="dk1"/>
-            </a:fontRef>
-          </p:style>
-          <p:txBody>
-            <a:bodyPr rtlCol="0" anchor="t"/>
-            <a:lstStyle/>
-            <a:p>
-              <a:pPr algn="ctr"/>
-              <a:r>
-                <a:rPr lang="en-US" dirty="0">
-                  <a:latin typeface="Arial" panose="020B0604020202020204" pitchFamily="34" charset="0"/>
-                  <a:cs typeface="Arial" panose="020B0604020202020204" pitchFamily="34" charset="0"/>
-                </a:rPr>
-                <a:t>Role1</a:t>
-              </a:r>
-            </a:p>
-          </p:txBody>
-        </p:sp>
-        <p:grpSp>
-          <p:nvGrpSpPr>
-            <p:cNvPr id="24" name="Group 23">
-              <a:extLst>
-                <a:ext uri="{FF2B5EF4-FFF2-40B4-BE49-F238E27FC236}">
-                  <a16:creationId xmlns:a16="http://schemas.microsoft.com/office/drawing/2014/main" id="{A1978F20-44D8-48CE-8C4A-DF016DCA9BB0}"/>
+                  <a16:creationId xmlns:a16="http://schemas.microsoft.com/office/drawing/2014/main" id="{635E61C4-0B32-4ED8-9CFE-124F7511C25F}"/>
                 </a:ext>
               </a:extLst>
             </p:cNvPr>
@@ -20585,7 +20523,7 @@
           </p:nvGrpSpPr>
           <p:grpSpPr>
             <a:xfrm>
-              <a:off x="2112579" y="1237923"/>
+              <a:off x="1618940" y="2249820"/>
               <a:ext cx="914400" cy="1036652"/>
               <a:chOff x="2080846" y="2264463"/>
               <a:chExt cx="914400" cy="1036652"/>
@@ -20593,10 +20531,10 @@
           </p:grpSpPr>
           <p:pic>
             <p:nvPicPr>
-              <p:cNvPr id="44" name="Graphic 43" descr="Users">
+              <p:cNvPr id="55" name="Graphic 54" descr="Users">
                 <a:extLst>
                   <a:ext uri="{FF2B5EF4-FFF2-40B4-BE49-F238E27FC236}">
-                    <a16:creationId xmlns:a16="http://schemas.microsoft.com/office/drawing/2014/main" id="{0B50C769-461A-4AD2-8053-66AA8031C73B}"/>
+                    <a16:creationId xmlns:a16="http://schemas.microsoft.com/office/drawing/2014/main" id="{A9B44502-0D0D-4D24-A9C8-325F5FAF99EB}"/>
                   </a:ext>
                 </a:extLst>
               </p:cNvPr>
@@ -20613,244 +20551,6 @@
                   </a:ext>
                   <a:ext uri="{96DAC541-7B7A-43D3-8B79-37D633B846F1}">
                     <asvg:svgBlip xmlns:asvg="http://schemas.microsoft.com/office/drawing/2016/SVG/main" r:embed="rId3"/>
-                  </a:ext>
-                </a:extLst>
-              </a:blip>
-              <a:stretch>
-                <a:fillRect/>
-              </a:stretch>
-            </p:blipFill>
-            <p:spPr>
-              <a:xfrm>
-                <a:off x="2080846" y="2264463"/>
-                <a:ext cx="914400" cy="914400"/>
-              </a:xfrm>
-              <a:prstGeom prst="rect">
-                <a:avLst/>
-              </a:prstGeom>
-            </p:spPr>
-          </p:pic>
-          <p:sp>
-            <p:nvSpPr>
-              <p:cNvPr id="21" name="TextBox 20">
-                <a:extLst>
-                  <a:ext uri="{FF2B5EF4-FFF2-40B4-BE49-F238E27FC236}">
-                    <a16:creationId xmlns:a16="http://schemas.microsoft.com/office/drawing/2014/main" id="{47CE6015-B4C8-47FF-9D75-0C3F920E1C98}"/>
-                  </a:ext>
-                </a:extLst>
-              </p:cNvPr>
-              <p:cNvSpPr txBox="1"/>
-              <p:nvPr/>
-            </p:nvSpPr>
-            <p:spPr>
-              <a:xfrm>
-                <a:off x="2147554" y="2993338"/>
-                <a:ext cx="780983" cy="307777"/>
-              </a:xfrm>
-              <a:prstGeom prst="rect">
-                <a:avLst/>
-              </a:prstGeom>
-              <a:noFill/>
-              <a:ln>
-                <a:noFill/>
-              </a:ln>
-            </p:spPr>
-            <p:style>
-              <a:lnRef idx="0">
-                <a:scrgbClr r="0" g="0" b="0"/>
-              </a:lnRef>
-              <a:fillRef idx="0">
-                <a:scrgbClr r="0" g="0" b="0"/>
-              </a:fillRef>
-              <a:effectRef idx="0">
-                <a:scrgbClr r="0" g="0" b="0"/>
-              </a:effectRef>
-              <a:fontRef idx="minor">
-                <a:schemeClr val="dk1"/>
-              </a:fontRef>
-            </p:style>
-            <p:txBody>
-              <a:bodyPr wrap="none" rtlCol="0">
-                <a:spAutoFit/>
-              </a:bodyPr>
-              <a:lstStyle/>
-              <a:p>
-                <a:r>
-                  <a:rPr lang="en-US" sz="1400" dirty="0">
-                    <a:latin typeface="Arial" panose="020B0604020202020204" pitchFamily="34" charset="0"/>
-                    <a:cs typeface="Arial" panose="020B0604020202020204" pitchFamily="34" charset="0"/>
-                  </a:rPr>
-                  <a:t>Group1</a:t>
-                </a:r>
-                <a:endParaRPr lang="en-US" dirty="0">
-                  <a:latin typeface="Arial" panose="020B0604020202020204" pitchFamily="34" charset="0"/>
-                  <a:cs typeface="Arial" panose="020B0604020202020204" pitchFamily="34" charset="0"/>
-                </a:endParaRPr>
-              </a:p>
-            </p:txBody>
-          </p:sp>
-        </p:grpSp>
-        <p:grpSp>
-          <p:nvGrpSpPr>
-            <p:cNvPr id="22" name="Group 21">
-              <a:extLst>
-                <a:ext uri="{FF2B5EF4-FFF2-40B4-BE49-F238E27FC236}">
-                  <a16:creationId xmlns:a16="http://schemas.microsoft.com/office/drawing/2014/main" id="{21B86CA8-4AC8-4976-BAC7-8DCC25D9AFF5}"/>
-                </a:ext>
-              </a:extLst>
-            </p:cNvPr>
-            <p:cNvGrpSpPr/>
-            <p:nvPr/>
-          </p:nvGrpSpPr>
-          <p:grpSpPr>
-            <a:xfrm>
-              <a:off x="3137809" y="1237923"/>
-              <a:ext cx="914400" cy="1036652"/>
-              <a:chOff x="3243860" y="2345746"/>
-              <a:chExt cx="914400" cy="1036652"/>
-            </a:xfrm>
-          </p:grpSpPr>
-          <p:pic>
-            <p:nvPicPr>
-              <p:cNvPr id="52" name="Graphic 51" descr="Users">
-                <a:extLst>
-                  <a:ext uri="{FF2B5EF4-FFF2-40B4-BE49-F238E27FC236}">
-                    <a16:creationId xmlns:a16="http://schemas.microsoft.com/office/drawing/2014/main" id="{FD0C4900-5112-4B88-B88A-3FC5BB8950B8}"/>
-                  </a:ext>
-                </a:extLst>
-              </p:cNvPr>
-              <p:cNvPicPr>
-                <a:picLocks noChangeAspect="1"/>
-              </p:cNvPicPr>
-              <p:nvPr/>
-            </p:nvPicPr>
-            <p:blipFill>
-              <a:blip r:embed="rId4">
-                <a:extLst>
-                  <a:ext uri="{28A0092B-C50C-407E-A947-70E740481C1C}">
-                    <a14:useLocalDpi xmlns:a14="http://schemas.microsoft.com/office/drawing/2010/main" val="0"/>
-                  </a:ext>
-                  <a:ext uri="{96DAC541-7B7A-43D3-8B79-37D633B846F1}">
-                    <asvg:svgBlip xmlns:asvg="http://schemas.microsoft.com/office/drawing/2016/SVG/main" r:embed="rId5"/>
-                  </a:ext>
-                </a:extLst>
-              </a:blip>
-              <a:stretch>
-                <a:fillRect/>
-              </a:stretch>
-            </p:blipFill>
-            <p:spPr>
-              <a:xfrm>
-                <a:off x="3243860" y="2345746"/>
-                <a:ext cx="914400" cy="914400"/>
-              </a:xfrm>
-              <a:prstGeom prst="rect">
-                <a:avLst/>
-              </a:prstGeom>
-            </p:spPr>
-          </p:pic>
-          <p:sp>
-            <p:nvSpPr>
-              <p:cNvPr id="53" name="TextBox 52">
-                <a:extLst>
-                  <a:ext uri="{FF2B5EF4-FFF2-40B4-BE49-F238E27FC236}">
-                    <a16:creationId xmlns:a16="http://schemas.microsoft.com/office/drawing/2014/main" id="{2483AF08-CC7B-4643-B13A-E473F0671C87}"/>
-                  </a:ext>
-                </a:extLst>
-              </p:cNvPr>
-              <p:cNvSpPr txBox="1"/>
-              <p:nvPr/>
-            </p:nvSpPr>
-            <p:spPr>
-              <a:xfrm>
-                <a:off x="3310568" y="3074621"/>
-                <a:ext cx="780983" cy="307777"/>
-              </a:xfrm>
-              <a:prstGeom prst="rect">
-                <a:avLst/>
-              </a:prstGeom>
-              <a:noFill/>
-              <a:ln>
-                <a:noFill/>
-              </a:ln>
-            </p:spPr>
-            <p:style>
-              <a:lnRef idx="0">
-                <a:scrgbClr r="0" g="0" b="0"/>
-              </a:lnRef>
-              <a:fillRef idx="0">
-                <a:scrgbClr r="0" g="0" b="0"/>
-              </a:fillRef>
-              <a:effectRef idx="0">
-                <a:scrgbClr r="0" g="0" b="0"/>
-              </a:effectRef>
-              <a:fontRef idx="minor">
-                <a:schemeClr val="dk1"/>
-              </a:fontRef>
-            </p:style>
-            <p:txBody>
-              <a:bodyPr wrap="none" rtlCol="0">
-                <a:spAutoFit/>
-              </a:bodyPr>
-              <a:lstStyle/>
-              <a:p>
-                <a:r>
-                  <a:rPr lang="en-US" sz="1400" dirty="0">
-                    <a:latin typeface="Arial" panose="020B0604020202020204" pitchFamily="34" charset="0"/>
-                    <a:cs typeface="Arial" panose="020B0604020202020204" pitchFamily="34" charset="0"/>
-                  </a:rPr>
-                  <a:t>Group2</a:t>
-                </a:r>
-                <a:endParaRPr lang="en-US" dirty="0">
-                  <a:latin typeface="Arial" panose="020B0604020202020204" pitchFamily="34" charset="0"/>
-                  <a:cs typeface="Arial" panose="020B0604020202020204" pitchFamily="34" charset="0"/>
-                </a:endParaRPr>
-              </a:p>
-            </p:txBody>
-          </p:sp>
-        </p:grpSp>
-        <p:grpSp>
-          <p:nvGrpSpPr>
-            <p:cNvPr id="54" name="Group 53">
-              <a:extLst>
-                <a:ext uri="{FF2B5EF4-FFF2-40B4-BE49-F238E27FC236}">
-                  <a16:creationId xmlns:a16="http://schemas.microsoft.com/office/drawing/2014/main" id="{635E61C4-0B32-4ED8-9CFE-124F7511C25F}"/>
-                </a:ext>
-              </a:extLst>
-            </p:cNvPr>
-            <p:cNvGrpSpPr/>
-            <p:nvPr/>
-          </p:nvGrpSpPr>
-          <p:grpSpPr>
-            <a:xfrm>
-              <a:off x="1618940" y="2249820"/>
-              <a:ext cx="914400" cy="1036652"/>
-              <a:chOff x="2080846" y="2264463"/>
-              <a:chExt cx="914400" cy="1036652"/>
-            </a:xfrm>
-          </p:grpSpPr>
-          <p:pic>
-            <p:nvPicPr>
-              <p:cNvPr id="55" name="Graphic 54" descr="Users">
-                <a:extLst>
-                  <a:ext uri="{FF2B5EF4-FFF2-40B4-BE49-F238E27FC236}">
-                    <a16:creationId xmlns:a16="http://schemas.microsoft.com/office/drawing/2014/main" id="{A9B44502-0D0D-4D24-A9C8-325F5FAF99EB}"/>
-                  </a:ext>
-                </a:extLst>
-              </p:cNvPr>
-              <p:cNvPicPr>
-                <a:picLocks noChangeAspect="1"/>
-              </p:cNvPicPr>
-              <p:nvPr/>
-            </p:nvPicPr>
-            <p:blipFill>
-              <a:blip r:embed="rId6">
-                <a:extLst>
-                  <a:ext uri="{28A0092B-C50C-407E-A947-70E740481C1C}">
-                    <a14:useLocalDpi xmlns:a14="http://schemas.microsoft.com/office/drawing/2010/main" val="0"/>
-                  </a:ext>
-                  <a:ext uri="{96DAC541-7B7A-43D3-8B79-37D633B846F1}">
-                    <asvg:svgBlip xmlns:asvg="http://schemas.microsoft.com/office/drawing/2016/SVG/main" r:embed="rId7"/>
                   </a:ext>
                 </a:extLst>
               </a:blip>
@@ -20997,13 +20697,13 @@
             <p:nvPr/>
           </p:nvPicPr>
           <p:blipFill>
-            <a:blip r:embed="rId8">
+            <a:blip r:embed="rId4">
               <a:extLst>
                 <a:ext uri="{28A0092B-C50C-407E-A947-70E740481C1C}">
                   <a14:useLocalDpi xmlns:a14="http://schemas.microsoft.com/office/drawing/2010/main" val="0"/>
                 </a:ext>
                 <a:ext uri="{96DAC541-7B7A-43D3-8B79-37D633B846F1}">
-                  <asvg:svgBlip xmlns:asvg="http://schemas.microsoft.com/office/drawing/2016/SVG/main" r:embed="rId9"/>
+                  <asvg:svgBlip xmlns:asvg="http://schemas.microsoft.com/office/drawing/2016/SVG/main" r:embed="rId5"/>
                 </a:ext>
               </a:extLst>
             </a:blip>
@@ -21036,13 +20736,13 @@
             <p:nvPr/>
           </p:nvPicPr>
           <p:blipFill>
-            <a:blip r:embed="rId10">
+            <a:blip r:embed="rId6">
               <a:extLst>
                 <a:ext uri="{28A0092B-C50C-407E-A947-70E740481C1C}">
                   <a14:useLocalDpi xmlns:a14="http://schemas.microsoft.com/office/drawing/2010/main" val="0"/>
                 </a:ext>
                 <a:ext uri="{96DAC541-7B7A-43D3-8B79-37D633B846F1}">
-                  <asvg:svgBlip xmlns:asvg="http://schemas.microsoft.com/office/drawing/2016/SVG/main" r:embed="rId11"/>
+                  <asvg:svgBlip xmlns:asvg="http://schemas.microsoft.com/office/drawing/2016/SVG/main" r:embed="rId7"/>
                 </a:ext>
               </a:extLst>
             </a:blip>
@@ -21075,13 +20775,13 @@
             <p:nvPr/>
           </p:nvPicPr>
           <p:blipFill>
-            <a:blip r:embed="rId12">
+            <a:blip r:embed="rId8">
               <a:extLst>
                 <a:ext uri="{28A0092B-C50C-407E-A947-70E740481C1C}">
                   <a14:useLocalDpi xmlns:a14="http://schemas.microsoft.com/office/drawing/2010/main" val="0"/>
                 </a:ext>
                 <a:ext uri="{96DAC541-7B7A-43D3-8B79-37D633B846F1}">
-                  <asvg:svgBlip xmlns:asvg="http://schemas.microsoft.com/office/drawing/2016/SVG/main" r:embed="rId13"/>
+                  <asvg:svgBlip xmlns:asvg="http://schemas.microsoft.com/office/drawing/2016/SVG/main" r:embed="rId9"/>
                 </a:ext>
               </a:extLst>
             </a:blip>
@@ -21267,60 +20967,8 @@
             </a:prstGeom>
             <a:ln w="25400">
               <a:solidFill>
-                <a:schemeClr val="tx1">
-                  <a:lumMod val="85000"/>
-                  <a:lumOff val="15000"/>
-                </a:schemeClr>
-              </a:solidFill>
-              <a:tailEnd type="triangle"/>
-            </a:ln>
-          </p:spPr>
-          <p:style>
-            <a:lnRef idx="1">
-              <a:schemeClr val="accent1"/>
-            </a:lnRef>
-            <a:fillRef idx="0">
-              <a:schemeClr val="accent1"/>
-            </a:fillRef>
-            <a:effectRef idx="0">
-              <a:schemeClr val="accent1"/>
-            </a:effectRef>
-            <a:fontRef idx="minor">
-              <a:schemeClr val="tx1"/>
-            </a:fontRef>
-          </p:style>
-        </p:cxnSp>
-        <p:cxnSp>
-          <p:nvCxnSpPr>
-            <p:cNvPr id="87" name="Straight Arrow Connector 84">
-              <a:extLst>
-                <a:ext uri="{FF2B5EF4-FFF2-40B4-BE49-F238E27FC236}">
-                  <a16:creationId xmlns:a16="http://schemas.microsoft.com/office/drawing/2014/main" id="{3D104B40-CC5D-413F-9F30-94C2DBF7CE0E}"/>
-                </a:ext>
-              </a:extLst>
-            </p:cNvPr>
-            <p:cNvCxnSpPr>
-              <a:cxnSpLocks/>
-              <a:stCxn id="50" idx="3"/>
-              <a:endCxn id="30" idx="1"/>
-            </p:cNvCxnSpPr>
-            <p:nvPr/>
-          </p:nvCxnSpPr>
-          <p:spPr>
-            <a:xfrm flipV="1">
-              <a:off x="4075657" y="1364687"/>
-              <a:ext cx="1419963" cy="207686"/>
-            </a:xfrm>
-            <a:prstGeom prst="curvedConnector3">
-              <a:avLst>
-                <a:gd name="adj1" fmla="val 50000"/>
-              </a:avLst>
-            </a:prstGeom>
-            <a:ln w="25400">
-              <a:solidFill>
-                <a:schemeClr val="tx1">
-                  <a:lumMod val="85000"/>
-                  <a:lumOff val="15000"/>
+                <a:schemeClr val="bg1">
+                  <a:lumMod val="50000"/>
                 </a:schemeClr>
               </a:solidFill>
               <a:tailEnd type="triangle"/>
@@ -21389,7 +21037,7 @@
               <a:ln w="25400">
                 <a:solidFill>
                   <a:schemeClr val="bg1">
-                    <a:lumMod val="65000"/>
+                    <a:lumMod val="50000"/>
                   </a:schemeClr>
                 </a:solidFill>
               </a:ln>
@@ -21458,13 +21106,13 @@
                 <p:nvPr/>
               </p:nvPicPr>
               <p:blipFill>
-                <a:blip r:embed="rId14">
+                <a:blip r:embed="rId10">
                   <a:extLst>
                     <a:ext uri="{28A0092B-C50C-407E-A947-70E740481C1C}">
                       <a14:useLocalDpi xmlns:a14="http://schemas.microsoft.com/office/drawing/2010/main" val="0"/>
                     </a:ext>
                     <a:ext uri="{96DAC541-7B7A-43D3-8B79-37D633B846F1}">
-                      <asvg:svgBlip xmlns:asvg="http://schemas.microsoft.com/office/drawing/2016/SVG/main" r:embed="rId15"/>
+                      <asvg:svgBlip xmlns:asvg="http://schemas.microsoft.com/office/drawing/2016/SVG/main" r:embed="rId11"/>
                     </a:ext>
                   </a:extLst>
                 </a:blip>
@@ -21542,6 +21190,354 @@
               </p:txBody>
             </p:sp>
           </p:grpSp>
+        </p:grpSp>
+        <p:cxnSp>
+          <p:nvCxnSpPr>
+            <p:cNvPr id="57" name="Straight Arrow Connector 84">
+              <a:extLst>
+                <a:ext uri="{FF2B5EF4-FFF2-40B4-BE49-F238E27FC236}">
+                  <a16:creationId xmlns:a16="http://schemas.microsoft.com/office/drawing/2014/main" id="{1C26C005-AE7C-455C-8D1F-7A615401E96E}"/>
+                </a:ext>
+              </a:extLst>
+            </p:cNvPr>
+            <p:cNvCxnSpPr>
+              <a:cxnSpLocks/>
+            </p:cNvCxnSpPr>
+            <p:nvPr/>
+          </p:nvCxnSpPr>
+          <p:spPr>
+            <a:xfrm flipV="1">
+              <a:off x="4071131" y="1370843"/>
+              <a:ext cx="1424488" cy="534637"/>
+            </a:xfrm>
+            <a:prstGeom prst="curvedConnector3">
+              <a:avLst>
+                <a:gd name="adj1" fmla="val -7301"/>
+              </a:avLst>
+            </a:prstGeom>
+            <a:ln w="25400">
+              <a:solidFill>
+                <a:schemeClr val="bg1">
+                  <a:lumMod val="50000"/>
+                </a:schemeClr>
+              </a:solidFill>
+              <a:tailEnd type="triangle"/>
+            </a:ln>
+          </p:spPr>
+          <p:style>
+            <a:lnRef idx="1">
+              <a:schemeClr val="accent1"/>
+            </a:lnRef>
+            <a:fillRef idx="0">
+              <a:schemeClr val="accent1"/>
+            </a:fillRef>
+            <a:effectRef idx="0">
+              <a:schemeClr val="accent1"/>
+            </a:effectRef>
+            <a:fontRef idx="minor">
+              <a:schemeClr val="tx1"/>
+            </a:fontRef>
+          </p:style>
+        </p:cxnSp>
+        <p:sp>
+          <p:nvSpPr>
+            <p:cNvPr id="50" name="Rectangle 49">
+              <a:extLst>
+                <a:ext uri="{FF2B5EF4-FFF2-40B4-BE49-F238E27FC236}">
+                  <a16:creationId xmlns:a16="http://schemas.microsoft.com/office/drawing/2014/main" id="{3D1B66CF-8078-4007-A335-995521066077}"/>
+                </a:ext>
+              </a:extLst>
+            </p:cNvPr>
+            <p:cNvSpPr/>
+            <p:nvPr/>
+          </p:nvSpPr>
+          <p:spPr>
+            <a:xfrm>
+              <a:off x="2080847" y="886573"/>
+              <a:ext cx="1994810" cy="1371599"/>
+            </a:xfrm>
+            <a:prstGeom prst="rect">
+              <a:avLst/>
+            </a:prstGeom>
+            <a:solidFill>
+              <a:schemeClr val="bg1">
+                <a:lumMod val="85000"/>
+              </a:schemeClr>
+            </a:solidFill>
+            <a:ln w="25400">
+              <a:solidFill>
+                <a:schemeClr val="bg1">
+                  <a:lumMod val="50000"/>
+                </a:schemeClr>
+              </a:solidFill>
+            </a:ln>
+          </p:spPr>
+          <p:style>
+            <a:lnRef idx="2">
+              <a:schemeClr val="dk1"/>
+            </a:lnRef>
+            <a:fillRef idx="1">
+              <a:schemeClr val="lt1"/>
+            </a:fillRef>
+            <a:effectRef idx="0">
+              <a:schemeClr val="dk1"/>
+            </a:effectRef>
+            <a:fontRef idx="minor">
+              <a:schemeClr val="dk1"/>
+            </a:fontRef>
+          </p:style>
+          <p:txBody>
+            <a:bodyPr rtlCol="0" anchor="t"/>
+            <a:lstStyle/>
+            <a:p>
+              <a:pPr algn="ctr"/>
+              <a:r>
+                <a:rPr lang="en-US" dirty="0">
+                  <a:latin typeface="Arial" panose="020B0604020202020204" pitchFamily="34" charset="0"/>
+                  <a:cs typeface="Arial" panose="020B0604020202020204" pitchFamily="34" charset="0"/>
+                </a:rPr>
+                <a:t>Role1</a:t>
+              </a:r>
+            </a:p>
+          </p:txBody>
+        </p:sp>
+        <p:grpSp>
+          <p:nvGrpSpPr>
+            <p:cNvPr id="24" name="Group 23">
+              <a:extLst>
+                <a:ext uri="{FF2B5EF4-FFF2-40B4-BE49-F238E27FC236}">
+                  <a16:creationId xmlns:a16="http://schemas.microsoft.com/office/drawing/2014/main" id="{A1978F20-44D8-48CE-8C4A-DF016DCA9BB0}"/>
+                </a:ext>
+              </a:extLst>
+            </p:cNvPr>
+            <p:cNvGrpSpPr/>
+            <p:nvPr/>
+          </p:nvGrpSpPr>
+          <p:grpSpPr>
+            <a:xfrm>
+              <a:off x="2112579" y="1237923"/>
+              <a:ext cx="914400" cy="1036652"/>
+              <a:chOff x="2080846" y="2264463"/>
+              <a:chExt cx="914400" cy="1036652"/>
+            </a:xfrm>
+          </p:grpSpPr>
+          <p:pic>
+            <p:nvPicPr>
+              <p:cNvPr id="44" name="Graphic 43" descr="Users">
+                <a:extLst>
+                  <a:ext uri="{FF2B5EF4-FFF2-40B4-BE49-F238E27FC236}">
+                    <a16:creationId xmlns:a16="http://schemas.microsoft.com/office/drawing/2014/main" id="{0B50C769-461A-4AD2-8053-66AA8031C73B}"/>
+                  </a:ext>
+                </a:extLst>
+              </p:cNvPr>
+              <p:cNvPicPr>
+                <a:picLocks noChangeAspect="1"/>
+              </p:cNvPicPr>
+              <p:nvPr/>
+            </p:nvPicPr>
+            <p:blipFill>
+              <a:blip r:embed="rId12">
+                <a:extLst>
+                  <a:ext uri="{28A0092B-C50C-407E-A947-70E740481C1C}">
+                    <a14:useLocalDpi xmlns:a14="http://schemas.microsoft.com/office/drawing/2010/main" val="0"/>
+                  </a:ext>
+                  <a:ext uri="{96DAC541-7B7A-43D3-8B79-37D633B846F1}">
+                    <asvg:svgBlip xmlns:asvg="http://schemas.microsoft.com/office/drawing/2016/SVG/main" r:embed="rId13"/>
+                  </a:ext>
+                </a:extLst>
+              </a:blip>
+              <a:stretch>
+                <a:fillRect/>
+              </a:stretch>
+            </p:blipFill>
+            <p:spPr>
+              <a:xfrm>
+                <a:off x="2080846" y="2264463"/>
+                <a:ext cx="914400" cy="914400"/>
+              </a:xfrm>
+              <a:prstGeom prst="rect">
+                <a:avLst/>
+              </a:prstGeom>
+            </p:spPr>
+          </p:pic>
+          <p:sp>
+            <p:nvSpPr>
+              <p:cNvPr id="21" name="TextBox 20">
+                <a:extLst>
+                  <a:ext uri="{FF2B5EF4-FFF2-40B4-BE49-F238E27FC236}">
+                    <a16:creationId xmlns:a16="http://schemas.microsoft.com/office/drawing/2014/main" id="{47CE6015-B4C8-47FF-9D75-0C3F920E1C98}"/>
+                  </a:ext>
+                </a:extLst>
+              </p:cNvPr>
+              <p:cNvSpPr txBox="1"/>
+              <p:nvPr/>
+            </p:nvSpPr>
+            <p:spPr>
+              <a:xfrm>
+                <a:off x="2147554" y="2993338"/>
+                <a:ext cx="780983" cy="307777"/>
+              </a:xfrm>
+              <a:prstGeom prst="rect">
+                <a:avLst/>
+              </a:prstGeom>
+              <a:noFill/>
+              <a:ln>
+                <a:noFill/>
+              </a:ln>
+            </p:spPr>
+            <p:style>
+              <a:lnRef idx="0">
+                <a:scrgbClr r="0" g="0" b="0"/>
+              </a:lnRef>
+              <a:fillRef idx="0">
+                <a:scrgbClr r="0" g="0" b="0"/>
+              </a:fillRef>
+              <a:effectRef idx="0">
+                <a:scrgbClr r="0" g="0" b="0"/>
+              </a:effectRef>
+              <a:fontRef idx="minor">
+                <a:schemeClr val="dk1"/>
+              </a:fontRef>
+            </p:style>
+            <p:txBody>
+              <a:bodyPr wrap="none" rtlCol="0">
+                <a:spAutoFit/>
+              </a:bodyPr>
+              <a:lstStyle/>
+              <a:p>
+                <a:r>
+                  <a:rPr lang="en-US" sz="1400" dirty="0">
+                    <a:latin typeface="Arial" panose="020B0604020202020204" pitchFamily="34" charset="0"/>
+                    <a:cs typeface="Arial" panose="020B0604020202020204" pitchFamily="34" charset="0"/>
+                  </a:rPr>
+                  <a:t>Group1</a:t>
+                </a:r>
+                <a:endParaRPr lang="en-US" dirty="0">
+                  <a:latin typeface="Arial" panose="020B0604020202020204" pitchFamily="34" charset="0"/>
+                  <a:cs typeface="Arial" panose="020B0604020202020204" pitchFamily="34" charset="0"/>
+                </a:endParaRPr>
+              </a:p>
+            </p:txBody>
+          </p:sp>
+        </p:grpSp>
+        <p:grpSp>
+          <p:nvGrpSpPr>
+            <p:cNvPr id="22" name="Group 21">
+              <a:extLst>
+                <a:ext uri="{FF2B5EF4-FFF2-40B4-BE49-F238E27FC236}">
+                  <a16:creationId xmlns:a16="http://schemas.microsoft.com/office/drawing/2014/main" id="{21B86CA8-4AC8-4976-BAC7-8DCC25D9AFF5}"/>
+                </a:ext>
+              </a:extLst>
+            </p:cNvPr>
+            <p:cNvGrpSpPr/>
+            <p:nvPr/>
+          </p:nvGrpSpPr>
+          <p:grpSpPr>
+            <a:xfrm>
+              <a:off x="3137809" y="1237923"/>
+              <a:ext cx="914400" cy="1036652"/>
+              <a:chOff x="3243860" y="2345746"/>
+              <a:chExt cx="914400" cy="1036652"/>
+            </a:xfrm>
+          </p:grpSpPr>
+          <p:pic>
+            <p:nvPicPr>
+              <p:cNvPr id="52" name="Graphic 51" descr="Users">
+                <a:extLst>
+                  <a:ext uri="{FF2B5EF4-FFF2-40B4-BE49-F238E27FC236}">
+                    <a16:creationId xmlns:a16="http://schemas.microsoft.com/office/drawing/2014/main" id="{FD0C4900-5112-4B88-B88A-3FC5BB8950B8}"/>
+                  </a:ext>
+                </a:extLst>
+              </p:cNvPr>
+              <p:cNvPicPr>
+                <a:picLocks noChangeAspect="1"/>
+              </p:cNvPicPr>
+              <p:nvPr/>
+            </p:nvPicPr>
+            <p:blipFill>
+              <a:blip r:embed="rId14">
+                <a:extLst>
+                  <a:ext uri="{28A0092B-C50C-407E-A947-70E740481C1C}">
+                    <a14:useLocalDpi xmlns:a14="http://schemas.microsoft.com/office/drawing/2010/main" val="0"/>
+                  </a:ext>
+                  <a:ext uri="{96DAC541-7B7A-43D3-8B79-37D633B846F1}">
+                    <asvg:svgBlip xmlns:asvg="http://schemas.microsoft.com/office/drawing/2016/SVG/main" r:embed="rId15"/>
+                  </a:ext>
+                </a:extLst>
+              </a:blip>
+              <a:stretch>
+                <a:fillRect/>
+              </a:stretch>
+            </p:blipFill>
+            <p:spPr>
+              <a:xfrm>
+                <a:off x="3243860" y="2345746"/>
+                <a:ext cx="914400" cy="914400"/>
+              </a:xfrm>
+              <a:prstGeom prst="rect">
+                <a:avLst/>
+              </a:prstGeom>
+            </p:spPr>
+          </p:pic>
+          <p:sp>
+            <p:nvSpPr>
+              <p:cNvPr id="53" name="TextBox 52">
+                <a:extLst>
+                  <a:ext uri="{FF2B5EF4-FFF2-40B4-BE49-F238E27FC236}">
+                    <a16:creationId xmlns:a16="http://schemas.microsoft.com/office/drawing/2014/main" id="{2483AF08-CC7B-4643-B13A-E473F0671C87}"/>
+                  </a:ext>
+                </a:extLst>
+              </p:cNvPr>
+              <p:cNvSpPr txBox="1"/>
+              <p:nvPr/>
+            </p:nvSpPr>
+            <p:spPr>
+              <a:xfrm>
+                <a:off x="3310568" y="3074621"/>
+                <a:ext cx="780983" cy="307777"/>
+              </a:xfrm>
+              <a:prstGeom prst="rect">
+                <a:avLst/>
+              </a:prstGeom>
+              <a:noFill/>
+              <a:ln>
+                <a:noFill/>
+              </a:ln>
+            </p:spPr>
+            <p:style>
+              <a:lnRef idx="0">
+                <a:scrgbClr r="0" g="0" b="0"/>
+              </a:lnRef>
+              <a:fillRef idx="0">
+                <a:scrgbClr r="0" g="0" b="0"/>
+              </a:fillRef>
+              <a:effectRef idx="0">
+                <a:scrgbClr r="0" g="0" b="0"/>
+              </a:effectRef>
+              <a:fontRef idx="minor">
+                <a:schemeClr val="dk1"/>
+              </a:fontRef>
+            </p:style>
+            <p:txBody>
+              <a:bodyPr wrap="none" rtlCol="0">
+                <a:spAutoFit/>
+              </a:bodyPr>
+              <a:lstStyle/>
+              <a:p>
+                <a:r>
+                  <a:rPr lang="en-US" sz="1400" dirty="0">
+                    <a:latin typeface="Arial" panose="020B0604020202020204" pitchFamily="34" charset="0"/>
+                    <a:cs typeface="Arial" panose="020B0604020202020204" pitchFamily="34" charset="0"/>
+                  </a:rPr>
+                  <a:t>Group2</a:t>
+                </a:r>
+                <a:endParaRPr lang="en-US" dirty="0">
+                  <a:latin typeface="Arial" panose="020B0604020202020204" pitchFamily="34" charset="0"/>
+                  <a:cs typeface="Arial" panose="020B0604020202020204" pitchFamily="34" charset="0"/>
+                </a:endParaRPr>
+              </a:p>
+            </p:txBody>
+          </p:sp>
         </p:grpSp>
       </p:grpSp>
     </p:spTree>

</xml_diff>